<commit_message>
Add the first presentation of the competitive programming course.
</commit_message>
<xml_diff>
--- a/git/Git - Semana 1 - Introduccion.pptx
+++ b/git/Git - Semana 1 - Introduccion.pptx
@@ -5,28 +5,29 @@
     <p:sldMasterId id="2147483780" r:id="rId1"/>
   </p:sldMasterIdLst>
   <p:sldIdLst>
-    <p:sldId id="256" r:id="rId2"/>
-    <p:sldId id="258" r:id="rId3"/>
-    <p:sldId id="259" r:id="rId4"/>
-    <p:sldId id="257" r:id="rId5"/>
-    <p:sldId id="261" r:id="rId6"/>
-    <p:sldId id="262" r:id="rId7"/>
-    <p:sldId id="277" r:id="rId8"/>
-    <p:sldId id="263" r:id="rId9"/>
-    <p:sldId id="266" r:id="rId10"/>
-    <p:sldId id="264" r:id="rId11"/>
-    <p:sldId id="260" r:id="rId12"/>
-    <p:sldId id="265" r:id="rId13"/>
-    <p:sldId id="268" r:id="rId14"/>
-    <p:sldId id="274" r:id="rId15"/>
-    <p:sldId id="270" r:id="rId16"/>
-    <p:sldId id="275" r:id="rId17"/>
-    <p:sldId id="271" r:id="rId18"/>
-    <p:sldId id="272" r:id="rId19"/>
-    <p:sldId id="273" r:id="rId20"/>
-    <p:sldId id="269" r:id="rId21"/>
-    <p:sldId id="276" r:id="rId22"/>
-    <p:sldId id="267" r:id="rId23"/>
+    <p:sldId id="278" r:id="rId2"/>
+    <p:sldId id="256" r:id="rId3"/>
+    <p:sldId id="258" r:id="rId4"/>
+    <p:sldId id="259" r:id="rId5"/>
+    <p:sldId id="257" r:id="rId6"/>
+    <p:sldId id="261" r:id="rId7"/>
+    <p:sldId id="262" r:id="rId8"/>
+    <p:sldId id="277" r:id="rId9"/>
+    <p:sldId id="263" r:id="rId10"/>
+    <p:sldId id="266" r:id="rId11"/>
+    <p:sldId id="264" r:id="rId12"/>
+    <p:sldId id="260" r:id="rId13"/>
+    <p:sldId id="265" r:id="rId14"/>
+    <p:sldId id="268" r:id="rId15"/>
+    <p:sldId id="274" r:id="rId16"/>
+    <p:sldId id="270" r:id="rId17"/>
+    <p:sldId id="275" r:id="rId18"/>
+    <p:sldId id="271" r:id="rId19"/>
+    <p:sldId id="272" r:id="rId20"/>
+    <p:sldId id="273" r:id="rId21"/>
+    <p:sldId id="269" r:id="rId22"/>
+    <p:sldId id="276" r:id="rId23"/>
+    <p:sldId id="267" r:id="rId24"/>
   </p:sldIdLst>
   <p:sldSz cx="12192000" cy="6858000"/>
   <p:notesSz cx="6858000" cy="9144000"/>
@@ -366,7 +367,7 @@
           <a:p>
             <a:fld id="{4CB1D59E-A200-4429-B13F-42C65375E1C9}" type="datetimeFigureOut">
               <a:rPr lang="es-ES" smtClean="0"/>
-              <a:t>17/10/18</a:t>
+              <a:t>13/3/19</a:t>
             </a:fld>
             <a:endParaRPr lang="es-ES"/>
           </a:p>
@@ -536,7 +537,7 @@
           <a:p>
             <a:fld id="{4CB1D59E-A200-4429-B13F-42C65375E1C9}" type="datetimeFigureOut">
               <a:rPr lang="es-ES" smtClean="0"/>
-              <a:t>17/10/18</a:t>
+              <a:t>13/3/19</a:t>
             </a:fld>
             <a:endParaRPr lang="es-ES"/>
           </a:p>
@@ -759,7 +760,7 @@
           <a:p>
             <a:fld id="{4CB1D59E-A200-4429-B13F-42C65375E1C9}" type="datetimeFigureOut">
               <a:rPr lang="es-ES" smtClean="0"/>
-              <a:t>17/10/18</a:t>
+              <a:t>13/3/19</a:t>
             </a:fld>
             <a:endParaRPr lang="es-ES"/>
           </a:p>
@@ -939,7 +940,7 @@
           <a:p>
             <a:fld id="{4CB1D59E-A200-4429-B13F-42C65375E1C9}" type="datetimeFigureOut">
               <a:rPr lang="es-ES" smtClean="0"/>
-              <a:t>17/10/18</a:t>
+              <a:t>13/3/19</a:t>
             </a:fld>
             <a:endParaRPr lang="es-ES"/>
           </a:p>
@@ -1283,7 +1284,7 @@
           <a:p>
             <a:fld id="{4CB1D59E-A200-4429-B13F-42C65375E1C9}" type="datetimeFigureOut">
               <a:rPr lang="es-ES" smtClean="0"/>
-              <a:t>17/10/18</a:t>
+              <a:t>13/3/19</a:t>
             </a:fld>
             <a:endParaRPr lang="es-ES"/>
           </a:p>
@@ -1587,7 +1588,7 @@
           <a:p>
             <a:fld id="{4CB1D59E-A200-4429-B13F-42C65375E1C9}" type="datetimeFigureOut">
               <a:rPr lang="es-ES" smtClean="0"/>
-              <a:t>17/10/18</a:t>
+              <a:t>13/3/19</a:t>
             </a:fld>
             <a:endParaRPr lang="es-ES"/>
           </a:p>
@@ -2009,7 +2010,7 @@
           <a:p>
             <a:fld id="{4CB1D59E-A200-4429-B13F-42C65375E1C9}" type="datetimeFigureOut">
               <a:rPr lang="es-ES" smtClean="0"/>
-              <a:t>17/10/18</a:t>
+              <a:t>13/3/19</a:t>
             </a:fld>
             <a:endParaRPr lang="es-ES"/>
           </a:p>
@@ -2127,7 +2128,7 @@
           <a:p>
             <a:fld id="{4CB1D59E-A200-4429-B13F-42C65375E1C9}" type="datetimeFigureOut">
               <a:rPr lang="es-ES" smtClean="0"/>
-              <a:t>17/10/18</a:t>
+              <a:t>13/3/19</a:t>
             </a:fld>
             <a:endParaRPr lang="es-ES"/>
           </a:p>
@@ -2222,7 +2223,7 @@
           <a:p>
             <a:fld id="{4CB1D59E-A200-4429-B13F-42C65375E1C9}" type="datetimeFigureOut">
               <a:rPr lang="es-ES" smtClean="0"/>
-              <a:t>17/10/18</a:t>
+              <a:t>13/3/19</a:t>
             </a:fld>
             <a:endParaRPr lang="es-ES"/>
           </a:p>
@@ -2495,7 +2496,7 @@
           <a:p>
             <a:fld id="{4CB1D59E-A200-4429-B13F-42C65375E1C9}" type="datetimeFigureOut">
               <a:rPr lang="es-ES" smtClean="0"/>
-              <a:t>17/10/18</a:t>
+              <a:t>13/3/19</a:t>
             </a:fld>
             <a:endParaRPr lang="es-ES"/>
           </a:p>
@@ -2760,7 +2761,7 @@
           <a:p>
             <a:fld id="{4CB1D59E-A200-4429-B13F-42C65375E1C9}" type="datetimeFigureOut">
               <a:rPr lang="es-ES" smtClean="0"/>
-              <a:t>17/10/18</a:t>
+              <a:t>13/3/19</a:t>
             </a:fld>
             <a:endParaRPr lang="es-ES"/>
           </a:p>
@@ -3009,7 +3010,7 @@
           <a:p>
             <a:fld id="{4CB1D59E-A200-4429-B13F-42C65375E1C9}" type="datetimeFigureOut">
               <a:rPr lang="es-ES" smtClean="0"/>
-              <a:t>17/10/18</a:t>
+              <a:t>13/3/19</a:t>
             </a:fld>
             <a:endParaRPr lang="es-ES"/>
           </a:p>
@@ -3469,7 +3470,7 @@
           <p:cNvPr id="2" name="Title 1">
             <a:extLst>
               <a:ext uri="{FF2B5EF4-FFF2-40B4-BE49-F238E27FC236}">
-                <a16:creationId xmlns:a16="http://schemas.microsoft.com/office/drawing/2014/main" id="{3244EE69-572A-4881-BF18-8DD674801142}"/>
+                <a16:creationId xmlns:a16="http://schemas.microsoft.com/office/drawing/2014/main" id="{B7A1DF49-9845-C340-98F8-9CD7D36A2846}"/>
               </a:ext>
             </a:extLst>
           </p:cNvPr>
@@ -3477,7 +3478,7 @@
             <a:spLocks noGrp="1"/>
           </p:cNvSpPr>
           <p:nvPr>
-            <p:ph type="ctrTitle"/>
+            <p:ph type="title"/>
           </p:nvPr>
         </p:nvSpPr>
         <p:spPr/>
@@ -3487,18 +3488,22 @@
           <a:p>
             <a:r>
               <a:rPr lang="en-US" dirty="0"/>
-              <a:t>Taller de git</a:t>
-            </a:r>
-            <a:endParaRPr lang="es-ES" dirty="0"/>
-          </a:p>
-        </p:txBody>
-      </p:sp>
-      <p:sp>
-        <p:nvSpPr>
-          <p:cNvPr id="3" name="Subtitle 2">
+              <a:t>Taller de git - </a:t>
+            </a:r>
+            <a:r>
+              <a:rPr lang="en-US" dirty="0" err="1"/>
+              <a:t>Registro</a:t>
+            </a:r>
+            <a:endParaRPr lang="en-US" dirty="0"/>
+          </a:p>
+        </p:txBody>
+      </p:sp>
+      <p:sp>
+        <p:nvSpPr>
+          <p:cNvPr id="3" name="Content Placeholder 2">
             <a:extLst>
               <a:ext uri="{FF2B5EF4-FFF2-40B4-BE49-F238E27FC236}">
-                <a16:creationId xmlns:a16="http://schemas.microsoft.com/office/drawing/2014/main" id="{A8109F25-FADA-4502-A728-4DE27E5CD526}"/>
+                <a16:creationId xmlns:a16="http://schemas.microsoft.com/office/drawing/2014/main" id="{87FC9AE4-C651-504C-9139-EF0C2F17CF69}"/>
               </a:ext>
             </a:extLst>
           </p:cNvPr>
@@ -3506,28 +3511,186 @@
             <a:spLocks noGrp="1"/>
           </p:cNvSpPr>
           <p:nvPr>
-            <p:ph type="subTitle" idx="1"/>
+            <p:ph idx="1"/>
           </p:nvPr>
         </p:nvSpPr>
         <p:spPr/>
         <p:txBody>
-          <a:bodyPr/>
-          <a:lstStyle/>
-          <a:p>
-            <a:r>
-              <a:rPr lang="es-MX" dirty="0"/>
-              <a:t>Introducción</a:t>
-            </a:r>
+          <a:bodyPr anchor="ctr"/>
+          <a:lstStyle/>
+          <a:p>
+            <a:pPr marL="0" indent="0">
+              <a:buNone/>
+            </a:pPr>
+            <a:r>
+              <a:rPr lang="es-MX" dirty="0"/>
+              <a:t>Por favor, regístrense llenando el formulario que está en la siguiente liga:</a:t>
+            </a:r>
+          </a:p>
+          <a:p>
+            <a:endParaRPr lang="es-MX" dirty="0"/>
+          </a:p>
+          <a:p>
+            <a:endParaRPr lang="es-MX" dirty="0"/>
+          </a:p>
+          <a:p>
+            <a:pPr marL="0" indent="0">
+              <a:buNone/>
+            </a:pPr>
+            <a:r>
+              <a:rPr lang="en-US" sz="6000" dirty="0"/>
+              <a:t>https://</a:t>
+            </a:r>
+            <a:r>
+              <a:rPr lang="en-US" sz="6000" dirty="0" err="1"/>
+              <a:t>goo.gl</a:t>
+            </a:r>
+            <a:r>
+              <a:rPr lang="en-US" sz="6000" dirty="0"/>
+              <a:t>/</a:t>
+            </a:r>
+            <a:r>
+              <a:rPr lang="en-US" sz="6000" dirty="0" err="1"/>
+              <a:t>BcQZyd</a:t>
+            </a:r>
+            <a:endParaRPr lang="es-MX" sz="6000" dirty="0"/>
+          </a:p>
+          <a:p>
+            <a:endParaRPr lang="es-MX" dirty="0"/>
+          </a:p>
+          <a:p>
+            <a:endParaRPr lang="en-US" dirty="0"/>
+          </a:p>
+        </p:txBody>
+      </p:sp>
+    </p:spTree>
+    <p:extLst>
+      <p:ext uri="{BB962C8B-B14F-4D97-AF65-F5344CB8AC3E}">
+        <p14:creationId xmlns:p14="http://schemas.microsoft.com/office/powerpoint/2010/main" val="3066890856"/>
+      </p:ext>
+    </p:extLst>
+  </p:cSld>
+  <p:clrMapOvr>
+    <a:masterClrMapping/>
+  </p:clrMapOvr>
+</p:sld>
+</file>
+
+<file path=ppt/slides/slide10.xml><?xml version="1.0" encoding="utf-8"?>
+<p:sld xmlns:a="http://schemas.openxmlformats.org/drawingml/2006/main" xmlns:r="http://schemas.openxmlformats.org/officeDocument/2006/relationships" xmlns:p="http://schemas.openxmlformats.org/presentationml/2006/main">
+  <p:cSld>
+    <p:spTree>
+      <p:nvGrpSpPr>
+        <p:cNvPr id="1" name=""/>
+        <p:cNvGrpSpPr/>
+        <p:nvPr/>
+      </p:nvGrpSpPr>
+      <p:grpSpPr>
+        <a:xfrm>
+          <a:off x="0" y="0"/>
+          <a:ext cx="0" cy="0"/>
+          <a:chOff x="0" y="0"/>
+          <a:chExt cx="0" cy="0"/>
+        </a:xfrm>
+      </p:grpSpPr>
+      <p:sp>
+        <p:nvSpPr>
+          <p:cNvPr id="2" name="Rectangle 1">
+            <a:extLst>
+              <a:ext uri="{FF2B5EF4-FFF2-40B4-BE49-F238E27FC236}">
+                <a16:creationId xmlns:a16="http://schemas.microsoft.com/office/drawing/2014/main" id="{168A70A8-2DB8-4049-BF18-F0B4E70EFC62}"/>
+              </a:ext>
+            </a:extLst>
+          </p:cNvPr>
+          <p:cNvSpPr/>
+          <p:nvPr/>
+        </p:nvSpPr>
+        <p:spPr>
+          <a:xfrm>
+            <a:off x="0" y="2286001"/>
+            <a:ext cx="12192000" cy="2171700"/>
+          </a:xfrm>
+          <a:prstGeom prst="rect">
+            <a:avLst/>
+          </a:prstGeom>
+          <a:solidFill>
+            <a:schemeClr val="tx1"/>
+          </a:solidFill>
+        </p:spPr>
+        <p:style>
+          <a:lnRef idx="2">
+            <a:schemeClr val="accent1">
+              <a:shade val="50000"/>
+            </a:schemeClr>
+          </a:lnRef>
+          <a:fillRef idx="1">
+            <a:schemeClr val="accent1"/>
+          </a:fillRef>
+          <a:effectRef idx="0">
+            <a:schemeClr val="accent1"/>
+          </a:effectRef>
+          <a:fontRef idx="minor">
+            <a:schemeClr val="lt1"/>
+          </a:fontRef>
+        </p:style>
+        <p:txBody>
+          <a:bodyPr rtlCol="0" anchor="ctr"/>
+          <a:lstStyle/>
+          <a:p>
+            <a:pPr algn="ctr"/>
             <a:endParaRPr lang="es-ES" dirty="0"/>
+          </a:p>
+        </p:txBody>
+      </p:sp>
+      <p:sp>
+        <p:nvSpPr>
+          <p:cNvPr id="3" name="Rectangle 2">
+            <a:extLst>
+              <a:ext uri="{FF2B5EF4-FFF2-40B4-BE49-F238E27FC236}">
+                <a16:creationId xmlns:a16="http://schemas.microsoft.com/office/drawing/2014/main" id="{80AF0E4D-199B-426E-A55A-DA62FF2789C7}"/>
+              </a:ext>
+            </a:extLst>
+          </p:cNvPr>
+          <p:cNvSpPr/>
+          <p:nvPr/>
+        </p:nvSpPr>
+        <p:spPr>
+          <a:xfrm>
+            <a:off x="2795417" y="2513494"/>
+            <a:ext cx="6601166" cy="1446550"/>
+          </a:xfrm>
+          <a:prstGeom prst="rect">
+            <a:avLst/>
+          </a:prstGeom>
+        </p:spPr>
+        <p:txBody>
+          <a:bodyPr wrap="none">
+            <a:spAutoFit/>
+          </a:bodyPr>
+          <a:lstStyle/>
+          <a:p>
+            <a:r>
+              <a:rPr lang="es-MX" sz="8800" dirty="0">
+                <a:solidFill>
+                  <a:schemeClr val="bg2"/>
+                </a:solidFill>
+              </a:rPr>
+              <a:t>¿Qué es          ?</a:t>
+            </a:r>
+            <a:endParaRPr lang="es-ES" dirty="0">
+              <a:solidFill>
+                <a:schemeClr val="bg2"/>
+              </a:solidFill>
+            </a:endParaRPr>
           </a:p>
         </p:txBody>
       </p:sp>
       <p:pic>
         <p:nvPicPr>
-          <p:cNvPr id="7" name="Picture 6">
+          <p:cNvPr id="5" name="Picture 4">
             <a:extLst>
               <a:ext uri="{FF2B5EF4-FFF2-40B4-BE49-F238E27FC236}">
-                <a16:creationId xmlns:a16="http://schemas.microsoft.com/office/drawing/2014/main" id="{90C0F741-F0B9-470C-BA06-9C6369D3BBBB}"/>
+                <a16:creationId xmlns:a16="http://schemas.microsoft.com/office/drawing/2014/main" id="{7C120C3B-586F-4908-8FE8-963AB2EFE3AF}"/>
               </a:ext>
             </a:extLst>
           </p:cNvPr>
@@ -3550,8 +3713,8 @@
         </p:blipFill>
         <p:spPr>
           <a:xfrm>
-            <a:off x="5051298" y="4662376"/>
-            <a:ext cx="2095500" cy="876300"/>
+            <a:off x="6745309" y="3015484"/>
+            <a:ext cx="1824446" cy="652874"/>
           </a:xfrm>
           <a:prstGeom prst="rect">
             <a:avLst/>
@@ -3561,7 +3724,7 @@
     </p:spTree>
     <p:extLst>
       <p:ext uri="{BB962C8B-B14F-4D97-AF65-F5344CB8AC3E}">
-        <p14:creationId xmlns:p14="http://schemas.microsoft.com/office/powerpoint/2010/main" val="1726703733"/>
+        <p14:creationId xmlns:p14="http://schemas.microsoft.com/office/powerpoint/2010/main" val="3156419099"/>
       </p:ext>
     </p:extLst>
   </p:cSld>
@@ -3571,7 +3734,7 @@
 </p:sld>
 </file>
 
-<file path=ppt/slides/slide10.xml><?xml version="1.0" encoding="utf-8"?>
+<file path=ppt/slides/slide11.xml><?xml version="1.0" encoding="utf-8"?>
 <p:sld xmlns:a="http://schemas.openxmlformats.org/drawingml/2006/main" xmlns:r="http://schemas.openxmlformats.org/officeDocument/2006/relationships" xmlns:p="http://schemas.openxmlformats.org/presentationml/2006/main">
   <p:cSld>
     <p:spTree>
@@ -3648,7 +3811,7 @@
 </p:sld>
 </file>
 
-<file path=ppt/slides/slide11.xml><?xml version="1.0" encoding="utf-8"?>
+<file path=ppt/slides/slide12.xml><?xml version="1.0" encoding="utf-8"?>
 <p:sld xmlns:a="http://schemas.openxmlformats.org/drawingml/2006/main" xmlns:r="http://schemas.openxmlformats.org/officeDocument/2006/relationships" xmlns:p="http://schemas.openxmlformats.org/presentationml/2006/main">
   <p:cSld>
     <p:spTree>
@@ -3794,7 +3957,7 @@
 </p:sld>
 </file>
 
-<file path=ppt/slides/slide12.xml><?xml version="1.0" encoding="utf-8"?>
+<file path=ppt/slides/slide13.xml><?xml version="1.0" encoding="utf-8"?>
 <p:sld xmlns:a="http://schemas.openxmlformats.org/drawingml/2006/main" xmlns:r="http://schemas.openxmlformats.org/officeDocument/2006/relationships" xmlns:p="http://schemas.openxmlformats.org/presentationml/2006/main">
   <p:cSld>
     <p:spTree>
@@ -3997,7 +4160,7 @@
 </p:sld>
 </file>
 
-<file path=ppt/slides/slide13.xml><?xml version="1.0" encoding="utf-8"?>
+<file path=ppt/slides/slide14.xml><?xml version="1.0" encoding="utf-8"?>
 <p:sld xmlns:a="http://schemas.openxmlformats.org/drawingml/2006/main" xmlns:r="http://schemas.openxmlformats.org/officeDocument/2006/relationships" xmlns:p="http://schemas.openxmlformats.org/presentationml/2006/main">
   <p:cSld>
     <p:spTree>
@@ -4089,7 +4252,7 @@
 </p:sld>
 </file>
 
-<file path=ppt/slides/slide14.xml><?xml version="1.0" encoding="utf-8"?>
+<file path=ppt/slides/slide15.xml><?xml version="1.0" encoding="utf-8"?>
 <p:sld xmlns:a="http://schemas.openxmlformats.org/drawingml/2006/main" xmlns:r="http://schemas.openxmlformats.org/officeDocument/2006/relationships" xmlns:p="http://schemas.openxmlformats.org/presentationml/2006/main">
   <p:cSld>
     <p:spTree>
@@ -4233,7 +4396,7 @@
 </p:sld>
 </file>
 
-<file path=ppt/slides/slide15.xml><?xml version="1.0" encoding="utf-8"?>
+<file path=ppt/slides/slide16.xml><?xml version="1.0" encoding="utf-8"?>
 <p:sld xmlns:a="http://schemas.openxmlformats.org/drawingml/2006/main" xmlns:r="http://schemas.openxmlformats.org/officeDocument/2006/relationships" xmlns:p="http://schemas.openxmlformats.org/presentationml/2006/main">
   <p:cSld>
     <p:spTree>
@@ -4352,7 +4515,7 @@
 </p:sld>
 </file>
 
-<file path=ppt/slides/slide16.xml><?xml version="1.0" encoding="utf-8"?>
+<file path=ppt/slides/slide17.xml><?xml version="1.0" encoding="utf-8"?>
 <p:sld xmlns:a="http://schemas.openxmlformats.org/drawingml/2006/main" xmlns:r="http://schemas.openxmlformats.org/officeDocument/2006/relationships" xmlns:p="http://schemas.openxmlformats.org/presentationml/2006/main">
   <p:cSld>
     <p:spTree>
@@ -4441,145 +4604,6 @@
 </p:sld>
 </file>
 
-<file path=ppt/slides/slide17.xml><?xml version="1.0" encoding="utf-8"?>
-<p:sld xmlns:a="http://schemas.openxmlformats.org/drawingml/2006/main" xmlns:r="http://schemas.openxmlformats.org/officeDocument/2006/relationships" xmlns:p="http://schemas.openxmlformats.org/presentationml/2006/main">
-  <p:cSld>
-    <p:spTree>
-      <p:nvGrpSpPr>
-        <p:cNvPr id="1" name=""/>
-        <p:cNvGrpSpPr/>
-        <p:nvPr/>
-      </p:nvGrpSpPr>
-      <p:grpSpPr>
-        <a:xfrm>
-          <a:off x="0" y="0"/>
-          <a:ext cx="0" cy="0"/>
-          <a:chOff x="0" y="0"/>
-          <a:chExt cx="0" cy="0"/>
-        </a:xfrm>
-      </p:grpSpPr>
-      <p:sp>
-        <p:nvSpPr>
-          <p:cNvPr id="2" name="Title 1">
-            <a:extLst>
-              <a:ext uri="{FF2B5EF4-FFF2-40B4-BE49-F238E27FC236}">
-                <a16:creationId xmlns:a16="http://schemas.microsoft.com/office/drawing/2014/main" id="{F8B59309-DD08-46C8-8D51-C0B79B9B9BDD}"/>
-              </a:ext>
-            </a:extLst>
-          </p:cNvPr>
-          <p:cNvSpPr>
-            <a:spLocks noGrp="1"/>
-          </p:cNvSpPr>
-          <p:nvPr>
-            <p:ph type="title"/>
-          </p:nvPr>
-        </p:nvSpPr>
-        <p:spPr/>
-        <p:txBody>
-          <a:bodyPr/>
-          <a:lstStyle/>
-          <a:p>
-            <a:r>
-              <a:rPr lang="es-MX" dirty="0"/>
-              <a:t>Mac</a:t>
-            </a:r>
-            <a:endParaRPr lang="es-ES" dirty="0"/>
-          </a:p>
-        </p:txBody>
-      </p:sp>
-      <p:sp>
-        <p:nvSpPr>
-          <p:cNvPr id="3" name="Content Placeholder 2">
-            <a:extLst>
-              <a:ext uri="{FF2B5EF4-FFF2-40B4-BE49-F238E27FC236}">
-                <a16:creationId xmlns:a16="http://schemas.microsoft.com/office/drawing/2014/main" id="{23312D59-61A6-4ED0-A98B-9C1B2DA6D45E}"/>
-              </a:ext>
-            </a:extLst>
-          </p:cNvPr>
-          <p:cNvSpPr>
-            <a:spLocks noGrp="1"/>
-          </p:cNvSpPr>
-          <p:nvPr>
-            <p:ph idx="1"/>
-          </p:nvPr>
-        </p:nvSpPr>
-        <p:spPr/>
-        <p:txBody>
-          <a:bodyPr/>
-          <a:lstStyle/>
-          <a:p>
-            <a:r>
-              <a:rPr lang="es-MX" dirty="0"/>
-              <a:t>Correr el siguiente comando en una terminal:</a:t>
-            </a:r>
-          </a:p>
-          <a:p>
-            <a:endParaRPr lang="es-MX" dirty="0"/>
-          </a:p>
-          <a:p>
-            <a:pPr lvl="1"/>
-            <a:r>
-              <a:rPr lang="es-MX" dirty="0" err="1">
-                <a:latin typeface="Consolas" panose="020B0609020204030204" pitchFamily="49" charset="0"/>
-              </a:rPr>
-              <a:t>git</a:t>
-            </a:r>
-            <a:r>
-              <a:rPr lang="es-MX" dirty="0">
-                <a:latin typeface="Consolas" panose="020B0609020204030204" pitchFamily="49" charset="0"/>
-              </a:rPr>
-              <a:t> -–</a:t>
-            </a:r>
-            <a:r>
-              <a:rPr lang="es-MX" dirty="0" err="1">
-                <a:latin typeface="Consolas" panose="020B0609020204030204" pitchFamily="49" charset="0"/>
-              </a:rPr>
-              <a:t>version</a:t>
-            </a:r>
-            <a:endParaRPr lang="es-MX" dirty="0">
-              <a:latin typeface="Consolas" panose="020B0609020204030204" pitchFamily="49" charset="0"/>
-            </a:endParaRPr>
-          </a:p>
-          <a:p>
-            <a:pPr lvl="1"/>
-            <a:endParaRPr lang="es-MX" dirty="0">
-              <a:latin typeface="Consolas" panose="020B0609020204030204" pitchFamily="49" charset="0"/>
-            </a:endParaRPr>
-          </a:p>
-          <a:p>
-            <a:pPr lvl="1"/>
-            <a:r>
-              <a:rPr lang="es-MX" sz="2200" dirty="0"/>
-              <a:t>Si </a:t>
-            </a:r>
-            <a:r>
-              <a:rPr lang="es-MX" sz="2400" dirty="0"/>
-              <a:t>Git</a:t>
-            </a:r>
-            <a:r>
-              <a:rPr lang="es-MX" sz="2200" dirty="0"/>
-              <a:t> no está instalado aparecerá un prompt para instalarlo</a:t>
-            </a:r>
-          </a:p>
-          <a:p>
-            <a:pPr lvl="1"/>
-            <a:endParaRPr lang="es-ES" dirty="0"/>
-          </a:p>
-        </p:txBody>
-      </p:sp>
-    </p:spTree>
-    <p:extLst>
-      <p:ext uri="{BB962C8B-B14F-4D97-AF65-F5344CB8AC3E}">
-        <p14:creationId xmlns:p14="http://schemas.microsoft.com/office/powerpoint/2010/main" val="2392434578"/>
-      </p:ext>
-    </p:extLst>
-  </p:cSld>
-  <p:clrMapOvr>
-    <a:masterClrMapping/>
-  </p:clrMapOvr>
-</p:sld>
-</file>
-
 <file path=ppt/slides/slide18.xml><?xml version="1.0" encoding="utf-8"?>
 <p:sld xmlns:a="http://schemas.openxmlformats.org/drawingml/2006/main" xmlns:r="http://schemas.openxmlformats.org/officeDocument/2006/relationships" xmlns:p="http://schemas.openxmlformats.org/presentationml/2006/main">
   <p:cSld>
@@ -4602,7 +4626,7 @@
           <p:cNvPr id="2" name="Title 1">
             <a:extLst>
               <a:ext uri="{FF2B5EF4-FFF2-40B4-BE49-F238E27FC236}">
-                <a16:creationId xmlns:a16="http://schemas.microsoft.com/office/drawing/2014/main" id="{5B8C6765-8208-4FB0-AB75-72EAB43E47EF}"/>
+                <a16:creationId xmlns:a16="http://schemas.microsoft.com/office/drawing/2014/main" id="{F8B59309-DD08-46C8-8D51-C0B79B9B9BDD}"/>
               </a:ext>
             </a:extLst>
           </p:cNvPr>
@@ -4613,19 +4637,14 @@
             <p:ph type="title"/>
           </p:nvPr>
         </p:nvSpPr>
-        <p:spPr>
-          <a:xfrm>
-            <a:off x="1202919" y="284176"/>
-            <a:ext cx="9784080" cy="1508760"/>
-          </a:xfrm>
-        </p:spPr>
-        <p:txBody>
-          <a:bodyPr/>
-          <a:lstStyle/>
-          <a:p>
-            <a:r>
-              <a:rPr lang="es-MX" dirty="0"/>
-              <a:t>Linux</a:t>
+        <p:spPr/>
+        <p:txBody>
+          <a:bodyPr/>
+          <a:lstStyle/>
+          <a:p>
+            <a:r>
+              <a:rPr lang="es-MX" dirty="0"/>
+              <a:t>Mac</a:t>
             </a:r>
             <a:endParaRPr lang="es-ES" dirty="0"/>
           </a:p>
@@ -4636,7 +4655,7 @@
           <p:cNvPr id="3" name="Content Placeholder 2">
             <a:extLst>
               <a:ext uri="{FF2B5EF4-FFF2-40B4-BE49-F238E27FC236}">
-                <a16:creationId xmlns:a16="http://schemas.microsoft.com/office/drawing/2014/main" id="{29271EB9-E40A-4196-8189-DD6D9D025358}"/>
+                <a16:creationId xmlns:a16="http://schemas.microsoft.com/office/drawing/2014/main" id="{23312D59-61A6-4ED0-A98B-9C1B2DA6D45E}"/>
               </a:ext>
             </a:extLst>
           </p:cNvPr>
@@ -4649,216 +4668,72 @@
         </p:nvSpPr>
         <p:spPr/>
         <p:txBody>
-          <a:bodyPr>
-            <a:normAutofit fontScale="85000" lnSpcReduction="20000"/>
-          </a:bodyPr>
-          <a:lstStyle/>
-          <a:p>
-            <a:r>
-              <a:rPr lang="es-MX" dirty="0"/>
-              <a:t>Hay varias opciones para Linux:</a:t>
-            </a:r>
+          <a:bodyPr/>
+          <a:lstStyle/>
+          <a:p>
+            <a:r>
+              <a:rPr lang="es-MX" dirty="0"/>
+              <a:t>Correr el siguiente comando en una terminal:</a:t>
+            </a:r>
+          </a:p>
+          <a:p>
+            <a:endParaRPr lang="es-MX" dirty="0"/>
           </a:p>
           <a:p>
             <a:pPr lvl="1"/>
-            <a:r>
-              <a:rPr lang="es-MX" dirty="0"/>
-              <a:t>Instalar desde código fuente</a:t>
-            </a:r>
-          </a:p>
-          <a:p>
-            <a:endParaRPr lang="es-MX" dirty="0"/>
-          </a:p>
-          <a:p>
-            <a:r>
-              <a:rPr lang="es-MX" dirty="0"/>
-              <a:t>U</a:t>
-            </a:r>
-            <a:r>
-              <a:rPr lang="es-ES" dirty="0" err="1"/>
-              <a:t>sar</a:t>
-            </a:r>
-            <a:r>
-              <a:rPr lang="es-ES" dirty="0"/>
-              <a:t> su manejador de paquetes para instalar:</a:t>
-            </a:r>
-          </a:p>
-          <a:p>
-            <a:endParaRPr lang="es-MX" dirty="0"/>
-          </a:p>
-          <a:p>
-            <a:pPr lvl="1"/>
-            <a:r>
-              <a:rPr lang="es-MX" dirty="0"/>
-              <a:t>D</a:t>
-            </a:r>
-            <a:r>
-              <a:rPr lang="es-ES" dirty="0" err="1"/>
-              <a:t>ebian</a:t>
-            </a:r>
-            <a:endParaRPr lang="es-ES" dirty="0"/>
-          </a:p>
-          <a:p>
-            <a:pPr lvl="2"/>
-            <a:r>
-              <a:rPr lang="es-MX" dirty="0"/>
-              <a:t>sudo </a:t>
-            </a:r>
-            <a:r>
-              <a:rPr lang="es-MX" dirty="0" err="1"/>
-              <a:t>apt-get</a:t>
-            </a:r>
-            <a:r>
-              <a:rPr lang="es-MX" dirty="0"/>
-              <a:t> </a:t>
-            </a:r>
-            <a:r>
-              <a:rPr lang="es-MX" dirty="0" err="1"/>
-              <a:t>install</a:t>
-            </a:r>
-            <a:r>
-              <a:rPr lang="es-MX" dirty="0"/>
-              <a:t> </a:t>
-            </a:r>
-            <a:r>
-              <a:rPr lang="es-MX" dirty="0" err="1"/>
-              <a:t>git-all</a:t>
-            </a:r>
-            <a:endParaRPr lang="es-MX" dirty="0"/>
-          </a:p>
-          <a:p>
-            <a:pPr lvl="2"/>
-            <a:endParaRPr lang="es-ES" dirty="0"/>
-          </a:p>
-          <a:p>
-            <a:pPr lvl="1"/>
-            <a:r>
-              <a:rPr lang="es-MX" dirty="0" err="1"/>
-              <a:t>RedHat</a:t>
-            </a:r>
-            <a:endParaRPr lang="es-ES" dirty="0"/>
-          </a:p>
-          <a:p>
-            <a:pPr lvl="2"/>
-            <a:r>
-              <a:rPr lang="es-MX" dirty="0">
-                <a:latin typeface="Consolas" panose="020B0609020204030204" pitchFamily="49" charset="0"/>
-              </a:rPr>
-              <a:t>sudo </a:t>
-            </a:r>
-            <a:r>
-              <a:rPr lang="es-MX" dirty="0" err="1">
-                <a:latin typeface="Consolas" panose="020B0609020204030204" pitchFamily="49" charset="0"/>
-              </a:rPr>
-              <a:t>yum</a:t>
-            </a:r>
-            <a:r>
-              <a:rPr lang="es-MX" dirty="0">
-                <a:latin typeface="Consolas" panose="020B0609020204030204" pitchFamily="49" charset="0"/>
-              </a:rPr>
-              <a:t> </a:t>
-            </a:r>
-            <a:r>
-              <a:rPr lang="es-MX" dirty="0" err="1">
-                <a:latin typeface="Consolas" panose="020B0609020204030204" pitchFamily="49" charset="0"/>
-              </a:rPr>
-              <a:t>install</a:t>
-            </a:r>
-            <a:r>
-              <a:rPr lang="es-MX" dirty="0">
-                <a:latin typeface="Consolas" panose="020B0609020204030204" pitchFamily="49" charset="0"/>
-              </a:rPr>
-              <a:t> </a:t>
-            </a:r>
             <a:r>
               <a:rPr lang="es-MX" dirty="0" err="1">
                 <a:latin typeface="Consolas" panose="020B0609020204030204" pitchFamily="49" charset="0"/>
               </a:rPr>
               <a:t>git</a:t>
             </a:r>
+            <a:r>
+              <a:rPr lang="es-MX" dirty="0">
+                <a:latin typeface="Consolas" panose="020B0609020204030204" pitchFamily="49" charset="0"/>
+              </a:rPr>
+              <a:t> -–</a:t>
+            </a:r>
+            <a:r>
+              <a:rPr lang="es-MX" dirty="0" err="1">
+                <a:latin typeface="Consolas" panose="020B0609020204030204" pitchFamily="49" charset="0"/>
+              </a:rPr>
+              <a:t>version</a:t>
+            </a:r>
             <a:endParaRPr lang="es-MX" dirty="0">
               <a:latin typeface="Consolas" panose="020B0609020204030204" pitchFamily="49" charset="0"/>
             </a:endParaRPr>
           </a:p>
           <a:p>
             <a:pPr lvl="1"/>
-            <a:endParaRPr lang="es-MX" dirty="0"/>
-          </a:p>
-          <a:p>
-            <a:pPr lvl="1"/>
-            <a:r>
-              <a:rPr lang="es-MX" dirty="0"/>
-              <a:t>F</a:t>
-            </a:r>
-            <a:r>
-              <a:rPr lang="es-ES" dirty="0" err="1"/>
-              <a:t>edora</a:t>
-            </a:r>
-            <a:endParaRPr lang="es-ES" dirty="0"/>
-          </a:p>
-          <a:p>
-            <a:pPr lvl="2"/>
-            <a:r>
-              <a:rPr lang="es-MX" dirty="0">
-                <a:latin typeface="Consolas" panose="020B0609020204030204" pitchFamily="49" charset="0"/>
-              </a:rPr>
-              <a:t>sudo </a:t>
-            </a:r>
-            <a:r>
-              <a:rPr lang="es-MX" dirty="0" err="1">
-                <a:latin typeface="Consolas" panose="020B0609020204030204" pitchFamily="49" charset="0"/>
-              </a:rPr>
-              <a:t>dnf</a:t>
-            </a:r>
-            <a:r>
-              <a:rPr lang="es-MX" dirty="0">
-                <a:latin typeface="Consolas" panose="020B0609020204030204" pitchFamily="49" charset="0"/>
-              </a:rPr>
-              <a:t> </a:t>
-            </a:r>
-            <a:r>
-              <a:rPr lang="es-MX" dirty="0" err="1">
-                <a:latin typeface="Consolas" panose="020B0609020204030204" pitchFamily="49" charset="0"/>
-              </a:rPr>
-              <a:t>install</a:t>
-            </a:r>
-            <a:r>
-              <a:rPr lang="es-MX" dirty="0">
-                <a:latin typeface="Consolas" panose="020B0609020204030204" pitchFamily="49" charset="0"/>
-              </a:rPr>
-              <a:t> </a:t>
-            </a:r>
-            <a:r>
-              <a:rPr lang="es-MX" dirty="0" err="1">
-                <a:latin typeface="Consolas" panose="020B0609020204030204" pitchFamily="49" charset="0"/>
-              </a:rPr>
-              <a:t>git-all</a:t>
-            </a:r>
             <a:endParaRPr lang="es-MX" dirty="0">
               <a:latin typeface="Consolas" panose="020B0609020204030204" pitchFamily="49" charset="0"/>
             </a:endParaRPr>
           </a:p>
           <a:p>
-            <a:pPr lvl="2"/>
-            <a:endParaRPr lang="es-MX" dirty="0">
-              <a:latin typeface="Consolas" panose="020B0609020204030204" pitchFamily="49" charset="0"/>
-            </a:endParaRPr>
-          </a:p>
-          <a:p>
             <a:pPr lvl="1"/>
             <a:r>
-              <a:rPr lang="es-MX" dirty="0">
-                <a:latin typeface="Consolas" panose="020B0609020204030204" pitchFamily="49" charset="0"/>
-              </a:rPr>
-              <a:t>Todos los demás https://git-scm.com/download/linux</a:t>
-            </a:r>
+              <a:rPr lang="es-MX" sz="2200" dirty="0"/>
+              <a:t>Si </a:t>
+            </a:r>
+            <a:r>
+              <a:rPr lang="es-MX" sz="2400" dirty="0"/>
+              <a:t>Git</a:t>
+            </a:r>
+            <a:r>
+              <a:rPr lang="es-MX" sz="2200" dirty="0"/>
+              <a:t> no está instalado aparecerá un prompt para instalarlo</a:t>
+            </a:r>
+          </a:p>
+          <a:p>
+            <a:pPr lvl="1"/>
+            <a:endParaRPr lang="es-ES" dirty="0"/>
           </a:p>
         </p:txBody>
       </p:sp>
     </p:spTree>
     <p:extLst>
       <p:ext uri="{BB962C8B-B14F-4D97-AF65-F5344CB8AC3E}">
-        <p14:creationId xmlns:p14="http://schemas.microsoft.com/office/powerpoint/2010/main" val="4249037665"/>
+        <p14:creationId xmlns:p14="http://schemas.microsoft.com/office/powerpoint/2010/main" val="2392434578"/>
       </p:ext>
     </p:extLst>
   </p:cSld>
@@ -4890,7 +4765,7 @@
           <p:cNvPr id="2" name="Title 1">
             <a:extLst>
               <a:ext uri="{FF2B5EF4-FFF2-40B4-BE49-F238E27FC236}">
-                <a16:creationId xmlns:a16="http://schemas.microsoft.com/office/drawing/2014/main" id="{323874BB-5E57-4063-9453-61DE7ADC2A6D}"/>
+                <a16:creationId xmlns:a16="http://schemas.microsoft.com/office/drawing/2014/main" id="{5B8C6765-8208-4FB0-AB75-72EAB43E47EF}"/>
               </a:ext>
             </a:extLst>
           </p:cNvPr>
@@ -4901,14 +4776,19 @@
             <p:ph type="title"/>
           </p:nvPr>
         </p:nvSpPr>
-        <p:spPr/>
-        <p:txBody>
-          <a:bodyPr/>
-          <a:lstStyle/>
-          <a:p>
-            <a:r>
-              <a:rPr lang="es-MX" dirty="0"/>
-              <a:t>Probando la instalación</a:t>
+        <p:spPr>
+          <a:xfrm>
+            <a:off x="1202919" y="284176"/>
+            <a:ext cx="9784080" cy="1508760"/>
+          </a:xfrm>
+        </p:spPr>
+        <p:txBody>
+          <a:bodyPr/>
+          <a:lstStyle/>
+          <a:p>
+            <a:r>
+              <a:rPr lang="es-MX" dirty="0"/>
+              <a:t>Linux</a:t>
             </a:r>
             <a:endParaRPr lang="es-ES" dirty="0"/>
           </a:p>
@@ -4919,7 +4799,7 @@
           <p:cNvPr id="3" name="Content Placeholder 2">
             <a:extLst>
               <a:ext uri="{FF2B5EF4-FFF2-40B4-BE49-F238E27FC236}">
-                <a16:creationId xmlns:a16="http://schemas.microsoft.com/office/drawing/2014/main" id="{1D8B3B73-700E-43B5-B98B-E32F6575D0C3}"/>
+                <a16:creationId xmlns:a16="http://schemas.microsoft.com/office/drawing/2014/main" id="{29271EB9-E40A-4196-8189-DD6D9D025358}"/>
               </a:ext>
             </a:extLst>
           </p:cNvPr>
@@ -4932,35 +4812,216 @@
         </p:nvSpPr>
         <p:spPr/>
         <p:txBody>
-          <a:bodyPr/>
-          <a:lstStyle/>
-          <a:p>
-            <a:r>
-              <a:rPr lang="es-MX" dirty="0"/>
-              <a:t>Correr el siguiente comando en una terminal</a:t>
+          <a:bodyPr>
+            <a:normAutofit fontScale="85000" lnSpcReduction="20000"/>
+          </a:bodyPr>
+          <a:lstStyle/>
+          <a:p>
+            <a:r>
+              <a:rPr lang="es-MX" dirty="0"/>
+              <a:t>Hay varias opciones para Linux:</a:t>
+            </a:r>
+          </a:p>
+          <a:p>
+            <a:pPr lvl="1"/>
+            <a:r>
+              <a:rPr lang="es-MX" dirty="0"/>
+              <a:t>Instalar desde código fuente</a:t>
             </a:r>
           </a:p>
           <a:p>
             <a:endParaRPr lang="es-MX" dirty="0"/>
           </a:p>
           <a:p>
+            <a:r>
+              <a:rPr lang="es-MX" dirty="0"/>
+              <a:t>U</a:t>
+            </a:r>
+            <a:r>
+              <a:rPr lang="es-ES" dirty="0" err="1"/>
+              <a:t>sar</a:t>
+            </a:r>
+            <a:r>
+              <a:rPr lang="es-ES" dirty="0"/>
+              <a:t> su manejador de paquetes para instalar:</a:t>
+            </a:r>
+          </a:p>
+          <a:p>
+            <a:endParaRPr lang="es-MX" dirty="0"/>
+          </a:p>
+          <a:p>
             <a:pPr lvl="1"/>
             <a:r>
+              <a:rPr lang="es-MX" dirty="0"/>
+              <a:t>D</a:t>
+            </a:r>
+            <a:r>
+              <a:rPr lang="es-ES" dirty="0" err="1"/>
+              <a:t>ebian</a:t>
+            </a:r>
+            <a:endParaRPr lang="es-ES" dirty="0"/>
+          </a:p>
+          <a:p>
+            <a:pPr lvl="2"/>
+            <a:r>
+              <a:rPr lang="es-MX" dirty="0"/>
+              <a:t>sudo </a:t>
+            </a:r>
+            <a:r>
               <a:rPr lang="es-MX" dirty="0" err="1"/>
+              <a:t>apt-get</a:t>
+            </a:r>
+            <a:r>
+              <a:rPr lang="es-MX" dirty="0"/>
+              <a:t> </a:t>
+            </a:r>
+            <a:r>
+              <a:rPr lang="es-MX" dirty="0" err="1"/>
+              <a:t>install</a:t>
+            </a:r>
+            <a:r>
+              <a:rPr lang="es-MX" dirty="0"/>
+              <a:t> </a:t>
+            </a:r>
+            <a:r>
+              <a:rPr lang="es-MX" dirty="0" err="1"/>
+              <a:t>git-all</a:t>
+            </a:r>
+            <a:endParaRPr lang="es-MX" dirty="0"/>
+          </a:p>
+          <a:p>
+            <a:pPr lvl="2"/>
+            <a:endParaRPr lang="es-ES" dirty="0"/>
+          </a:p>
+          <a:p>
+            <a:pPr lvl="1"/>
+            <a:r>
+              <a:rPr lang="es-MX" dirty="0" err="1"/>
+              <a:t>RedHat</a:t>
+            </a:r>
+            <a:endParaRPr lang="es-ES" dirty="0"/>
+          </a:p>
+          <a:p>
+            <a:pPr lvl="2"/>
+            <a:r>
+              <a:rPr lang="es-MX" dirty="0">
+                <a:latin typeface="Consolas" panose="020B0609020204030204" pitchFamily="49" charset="0"/>
+              </a:rPr>
+              <a:t>sudo </a:t>
+            </a:r>
+            <a:r>
+              <a:rPr lang="es-MX" dirty="0" err="1">
+                <a:latin typeface="Consolas" panose="020B0609020204030204" pitchFamily="49" charset="0"/>
+              </a:rPr>
+              <a:t>yum</a:t>
+            </a:r>
+            <a:r>
+              <a:rPr lang="es-MX" dirty="0">
+                <a:latin typeface="Consolas" panose="020B0609020204030204" pitchFamily="49" charset="0"/>
+              </a:rPr>
+              <a:t> </a:t>
+            </a:r>
+            <a:r>
+              <a:rPr lang="es-MX" dirty="0" err="1">
+                <a:latin typeface="Consolas" panose="020B0609020204030204" pitchFamily="49" charset="0"/>
+              </a:rPr>
+              <a:t>install</a:t>
+            </a:r>
+            <a:r>
+              <a:rPr lang="es-MX" dirty="0">
+                <a:latin typeface="Consolas" panose="020B0609020204030204" pitchFamily="49" charset="0"/>
+              </a:rPr>
+              <a:t> </a:t>
+            </a:r>
+            <a:r>
+              <a:rPr lang="es-MX" dirty="0" err="1">
+                <a:latin typeface="Consolas" panose="020B0609020204030204" pitchFamily="49" charset="0"/>
+              </a:rPr>
               <a:t>git</a:t>
             </a:r>
-            <a:r>
-              <a:rPr lang="es-MX" dirty="0"/>
-              <a:t> -v</a:t>
+            <a:endParaRPr lang="es-MX" dirty="0">
+              <a:latin typeface="Consolas" panose="020B0609020204030204" pitchFamily="49" charset="0"/>
+            </a:endParaRPr>
+          </a:p>
+          <a:p>
+            <a:pPr lvl="1"/>
+            <a:endParaRPr lang="es-MX" dirty="0"/>
+          </a:p>
+          <a:p>
+            <a:pPr lvl="1"/>
+            <a:r>
+              <a:rPr lang="es-MX" dirty="0"/>
+              <a:t>F</a:t>
+            </a:r>
+            <a:r>
+              <a:rPr lang="es-ES" dirty="0" err="1"/>
+              <a:t>edora</a:t>
             </a:r>
             <a:endParaRPr lang="es-ES" dirty="0"/>
+          </a:p>
+          <a:p>
+            <a:pPr lvl="2"/>
+            <a:r>
+              <a:rPr lang="es-MX" dirty="0">
+                <a:latin typeface="Consolas" panose="020B0609020204030204" pitchFamily="49" charset="0"/>
+              </a:rPr>
+              <a:t>sudo </a:t>
+            </a:r>
+            <a:r>
+              <a:rPr lang="es-MX" dirty="0" err="1">
+                <a:latin typeface="Consolas" panose="020B0609020204030204" pitchFamily="49" charset="0"/>
+              </a:rPr>
+              <a:t>dnf</a:t>
+            </a:r>
+            <a:r>
+              <a:rPr lang="es-MX" dirty="0">
+                <a:latin typeface="Consolas" panose="020B0609020204030204" pitchFamily="49" charset="0"/>
+              </a:rPr>
+              <a:t> </a:t>
+            </a:r>
+            <a:r>
+              <a:rPr lang="es-MX" dirty="0" err="1">
+                <a:latin typeface="Consolas" panose="020B0609020204030204" pitchFamily="49" charset="0"/>
+              </a:rPr>
+              <a:t>install</a:t>
+            </a:r>
+            <a:r>
+              <a:rPr lang="es-MX" dirty="0">
+                <a:latin typeface="Consolas" panose="020B0609020204030204" pitchFamily="49" charset="0"/>
+              </a:rPr>
+              <a:t> </a:t>
+            </a:r>
+            <a:r>
+              <a:rPr lang="es-MX" dirty="0" err="1">
+                <a:latin typeface="Consolas" panose="020B0609020204030204" pitchFamily="49" charset="0"/>
+              </a:rPr>
+              <a:t>git-all</a:t>
+            </a:r>
+            <a:endParaRPr lang="es-MX" dirty="0">
+              <a:latin typeface="Consolas" panose="020B0609020204030204" pitchFamily="49" charset="0"/>
+            </a:endParaRPr>
+          </a:p>
+          <a:p>
+            <a:pPr lvl="2"/>
+            <a:endParaRPr lang="es-MX" dirty="0">
+              <a:latin typeface="Consolas" panose="020B0609020204030204" pitchFamily="49" charset="0"/>
+            </a:endParaRPr>
+          </a:p>
+          <a:p>
+            <a:pPr lvl="1"/>
+            <a:r>
+              <a:rPr lang="es-MX" dirty="0">
+                <a:latin typeface="Consolas" panose="020B0609020204030204" pitchFamily="49" charset="0"/>
+              </a:rPr>
+              <a:t>Todos los demás https://git-scm.com/download/linux</a:t>
+            </a:r>
           </a:p>
         </p:txBody>
       </p:sp>
     </p:spTree>
     <p:extLst>
       <p:ext uri="{BB962C8B-B14F-4D97-AF65-F5344CB8AC3E}">
-        <p14:creationId xmlns:p14="http://schemas.microsoft.com/office/powerpoint/2010/main" val="1710977376"/>
+        <p14:creationId xmlns:p14="http://schemas.microsoft.com/office/powerpoint/2010/main" val="4249037665"/>
       </p:ext>
     </p:extLst>
   </p:cSld>
@@ -4992,6 +5053,604 @@
           <p:cNvPr id="2" name="Title 1">
             <a:extLst>
               <a:ext uri="{FF2B5EF4-FFF2-40B4-BE49-F238E27FC236}">
+                <a16:creationId xmlns:a16="http://schemas.microsoft.com/office/drawing/2014/main" id="{3244EE69-572A-4881-BF18-8DD674801142}"/>
+              </a:ext>
+            </a:extLst>
+          </p:cNvPr>
+          <p:cNvSpPr>
+            <a:spLocks noGrp="1"/>
+          </p:cNvSpPr>
+          <p:nvPr>
+            <p:ph type="ctrTitle"/>
+          </p:nvPr>
+        </p:nvSpPr>
+        <p:spPr/>
+        <p:txBody>
+          <a:bodyPr/>
+          <a:lstStyle/>
+          <a:p>
+            <a:r>
+              <a:rPr lang="en-US" dirty="0"/>
+              <a:t>Taller de git</a:t>
+            </a:r>
+            <a:endParaRPr lang="es-ES" dirty="0"/>
+          </a:p>
+        </p:txBody>
+      </p:sp>
+      <p:sp>
+        <p:nvSpPr>
+          <p:cNvPr id="3" name="Subtitle 2">
+            <a:extLst>
+              <a:ext uri="{FF2B5EF4-FFF2-40B4-BE49-F238E27FC236}">
+                <a16:creationId xmlns:a16="http://schemas.microsoft.com/office/drawing/2014/main" id="{A8109F25-FADA-4502-A728-4DE27E5CD526}"/>
+              </a:ext>
+            </a:extLst>
+          </p:cNvPr>
+          <p:cNvSpPr>
+            <a:spLocks noGrp="1"/>
+          </p:cNvSpPr>
+          <p:nvPr>
+            <p:ph type="subTitle" idx="1"/>
+          </p:nvPr>
+        </p:nvSpPr>
+        <p:spPr/>
+        <p:txBody>
+          <a:bodyPr/>
+          <a:lstStyle/>
+          <a:p>
+            <a:r>
+              <a:rPr lang="es-MX" dirty="0"/>
+              <a:t>Introducción</a:t>
+            </a:r>
+            <a:endParaRPr lang="es-ES" dirty="0"/>
+          </a:p>
+        </p:txBody>
+      </p:sp>
+      <p:pic>
+        <p:nvPicPr>
+          <p:cNvPr id="7" name="Picture 6">
+            <a:extLst>
+              <a:ext uri="{FF2B5EF4-FFF2-40B4-BE49-F238E27FC236}">
+                <a16:creationId xmlns:a16="http://schemas.microsoft.com/office/drawing/2014/main" id="{90C0F741-F0B9-470C-BA06-9C6369D3BBBB}"/>
+              </a:ext>
+            </a:extLst>
+          </p:cNvPr>
+          <p:cNvPicPr>
+            <a:picLocks noChangeAspect="1"/>
+          </p:cNvPicPr>
+          <p:nvPr/>
+        </p:nvPicPr>
+        <p:blipFill>
+          <a:blip r:embed="rId2">
+            <a:extLst>
+              <a:ext uri="{28A0092B-C50C-407E-A947-70E740481C1C}">
+                <a14:useLocalDpi xmlns:a14="http://schemas.microsoft.com/office/drawing/2010/main" val="0"/>
+              </a:ext>
+            </a:extLst>
+          </a:blip>
+          <a:stretch>
+            <a:fillRect/>
+          </a:stretch>
+        </p:blipFill>
+        <p:spPr>
+          <a:xfrm>
+            <a:off x="5051298" y="4662376"/>
+            <a:ext cx="2095500" cy="876300"/>
+          </a:xfrm>
+          <a:prstGeom prst="rect">
+            <a:avLst/>
+          </a:prstGeom>
+        </p:spPr>
+      </p:pic>
+    </p:spTree>
+    <p:extLst>
+      <p:ext uri="{BB962C8B-B14F-4D97-AF65-F5344CB8AC3E}">
+        <p14:creationId xmlns:p14="http://schemas.microsoft.com/office/powerpoint/2010/main" val="1726703733"/>
+      </p:ext>
+    </p:extLst>
+  </p:cSld>
+  <p:clrMapOvr>
+    <a:masterClrMapping/>
+  </p:clrMapOvr>
+</p:sld>
+</file>
+
+<file path=ppt/slides/slide20.xml><?xml version="1.0" encoding="utf-8"?>
+<p:sld xmlns:a="http://schemas.openxmlformats.org/drawingml/2006/main" xmlns:r="http://schemas.openxmlformats.org/officeDocument/2006/relationships" xmlns:p="http://schemas.openxmlformats.org/presentationml/2006/main">
+  <p:cSld>
+    <p:spTree>
+      <p:nvGrpSpPr>
+        <p:cNvPr id="1" name=""/>
+        <p:cNvGrpSpPr/>
+        <p:nvPr/>
+      </p:nvGrpSpPr>
+      <p:grpSpPr>
+        <a:xfrm>
+          <a:off x="0" y="0"/>
+          <a:ext cx="0" cy="0"/>
+          <a:chOff x="0" y="0"/>
+          <a:chExt cx="0" cy="0"/>
+        </a:xfrm>
+      </p:grpSpPr>
+      <p:sp>
+        <p:nvSpPr>
+          <p:cNvPr id="2" name="Title 1">
+            <a:extLst>
+              <a:ext uri="{FF2B5EF4-FFF2-40B4-BE49-F238E27FC236}">
+                <a16:creationId xmlns:a16="http://schemas.microsoft.com/office/drawing/2014/main" id="{323874BB-5E57-4063-9453-61DE7ADC2A6D}"/>
+              </a:ext>
+            </a:extLst>
+          </p:cNvPr>
+          <p:cNvSpPr>
+            <a:spLocks noGrp="1"/>
+          </p:cNvSpPr>
+          <p:nvPr>
+            <p:ph type="title"/>
+          </p:nvPr>
+        </p:nvSpPr>
+        <p:spPr/>
+        <p:txBody>
+          <a:bodyPr/>
+          <a:lstStyle/>
+          <a:p>
+            <a:r>
+              <a:rPr lang="es-MX" dirty="0"/>
+              <a:t>Probando la instalación</a:t>
+            </a:r>
+            <a:endParaRPr lang="es-ES" dirty="0"/>
+          </a:p>
+        </p:txBody>
+      </p:sp>
+      <p:sp>
+        <p:nvSpPr>
+          <p:cNvPr id="3" name="Content Placeholder 2">
+            <a:extLst>
+              <a:ext uri="{FF2B5EF4-FFF2-40B4-BE49-F238E27FC236}">
+                <a16:creationId xmlns:a16="http://schemas.microsoft.com/office/drawing/2014/main" id="{1D8B3B73-700E-43B5-B98B-E32F6575D0C3}"/>
+              </a:ext>
+            </a:extLst>
+          </p:cNvPr>
+          <p:cNvSpPr>
+            <a:spLocks noGrp="1"/>
+          </p:cNvSpPr>
+          <p:nvPr>
+            <p:ph idx="1"/>
+          </p:nvPr>
+        </p:nvSpPr>
+        <p:spPr/>
+        <p:txBody>
+          <a:bodyPr/>
+          <a:lstStyle/>
+          <a:p>
+            <a:r>
+              <a:rPr lang="es-MX" dirty="0"/>
+              <a:t>Correr el siguiente comando en una terminal</a:t>
+            </a:r>
+          </a:p>
+          <a:p>
+            <a:endParaRPr lang="es-MX" dirty="0"/>
+          </a:p>
+          <a:p>
+            <a:pPr lvl="1"/>
+            <a:r>
+              <a:rPr lang="es-MX" dirty="0" err="1"/>
+              <a:t>git</a:t>
+            </a:r>
+            <a:r>
+              <a:rPr lang="es-MX" dirty="0"/>
+              <a:t> -v</a:t>
+            </a:r>
+            <a:endParaRPr lang="es-ES" dirty="0"/>
+          </a:p>
+        </p:txBody>
+      </p:sp>
+    </p:spTree>
+    <p:extLst>
+      <p:ext uri="{BB962C8B-B14F-4D97-AF65-F5344CB8AC3E}">
+        <p14:creationId xmlns:p14="http://schemas.microsoft.com/office/powerpoint/2010/main" val="1710977376"/>
+      </p:ext>
+    </p:extLst>
+  </p:cSld>
+  <p:clrMapOvr>
+    <a:masterClrMapping/>
+  </p:clrMapOvr>
+</p:sld>
+</file>
+
+<file path=ppt/slides/slide21.xml><?xml version="1.0" encoding="utf-8"?>
+<p:sld xmlns:a="http://schemas.openxmlformats.org/drawingml/2006/main" xmlns:r="http://schemas.openxmlformats.org/officeDocument/2006/relationships" xmlns:p="http://schemas.openxmlformats.org/presentationml/2006/main">
+  <p:cSld>
+    <p:spTree>
+      <p:nvGrpSpPr>
+        <p:cNvPr id="1" name=""/>
+        <p:cNvGrpSpPr/>
+        <p:nvPr/>
+      </p:nvGrpSpPr>
+      <p:grpSpPr>
+        <a:xfrm>
+          <a:off x="0" y="0"/>
+          <a:ext cx="0" cy="0"/>
+          <a:chOff x="0" y="0"/>
+          <a:chExt cx="0" cy="0"/>
+        </a:xfrm>
+      </p:grpSpPr>
+      <p:sp>
+        <p:nvSpPr>
+          <p:cNvPr id="2" name="Title 1">
+            <a:extLst>
+              <a:ext uri="{FF2B5EF4-FFF2-40B4-BE49-F238E27FC236}">
+                <a16:creationId xmlns:a16="http://schemas.microsoft.com/office/drawing/2014/main" id="{B7B07886-2075-4C24-B7CB-D5CC48E045CC}"/>
+              </a:ext>
+            </a:extLst>
+          </p:cNvPr>
+          <p:cNvSpPr>
+            <a:spLocks noGrp="1"/>
+          </p:cNvSpPr>
+          <p:nvPr>
+            <p:ph type="title"/>
+          </p:nvPr>
+        </p:nvSpPr>
+        <p:spPr/>
+        <p:txBody>
+          <a:bodyPr/>
+          <a:lstStyle/>
+          <a:p>
+            <a:r>
+              <a:rPr lang="es-MX" dirty="0"/>
+              <a:t>Mi primer repositorio</a:t>
+            </a:r>
+            <a:endParaRPr lang="es-ES" dirty="0"/>
+          </a:p>
+        </p:txBody>
+      </p:sp>
+      <p:sp>
+        <p:nvSpPr>
+          <p:cNvPr id="3" name="Text Placeholder 2">
+            <a:extLst>
+              <a:ext uri="{FF2B5EF4-FFF2-40B4-BE49-F238E27FC236}">
+                <a16:creationId xmlns:a16="http://schemas.microsoft.com/office/drawing/2014/main" id="{056B03C7-9F6A-45CC-A33C-D7DD8CD7ADCE}"/>
+              </a:ext>
+            </a:extLst>
+          </p:cNvPr>
+          <p:cNvSpPr>
+            <a:spLocks noGrp="1"/>
+          </p:cNvSpPr>
+          <p:nvPr>
+            <p:ph type="body" idx="1"/>
+          </p:nvPr>
+        </p:nvSpPr>
+        <p:spPr/>
+        <p:txBody>
+          <a:bodyPr/>
+          <a:lstStyle/>
+          <a:p>
+            <a:endParaRPr lang="es-ES" dirty="0"/>
+          </a:p>
+        </p:txBody>
+      </p:sp>
+    </p:spTree>
+    <p:extLst>
+      <p:ext uri="{BB962C8B-B14F-4D97-AF65-F5344CB8AC3E}">
+        <p14:creationId xmlns:p14="http://schemas.microsoft.com/office/powerpoint/2010/main" val="3454260894"/>
+      </p:ext>
+    </p:extLst>
+  </p:cSld>
+  <p:clrMapOvr>
+    <a:masterClrMapping/>
+  </p:clrMapOvr>
+</p:sld>
+</file>
+
+<file path=ppt/slides/slide22.xml><?xml version="1.0" encoding="utf-8"?>
+<p:sld xmlns:a="http://schemas.openxmlformats.org/drawingml/2006/main" xmlns:r="http://schemas.openxmlformats.org/officeDocument/2006/relationships" xmlns:p="http://schemas.openxmlformats.org/presentationml/2006/main">
+  <p:cSld>
+    <p:spTree>
+      <p:nvGrpSpPr>
+        <p:cNvPr id="1" name=""/>
+        <p:cNvGrpSpPr/>
+        <p:nvPr/>
+      </p:nvGrpSpPr>
+      <p:grpSpPr>
+        <a:xfrm>
+          <a:off x="0" y="0"/>
+          <a:ext cx="0" cy="0"/>
+          <a:chOff x="0" y="0"/>
+          <a:chExt cx="0" cy="0"/>
+        </a:xfrm>
+      </p:grpSpPr>
+      <p:sp>
+        <p:nvSpPr>
+          <p:cNvPr id="2" name="Title 1">
+            <a:extLst>
+              <a:ext uri="{FF2B5EF4-FFF2-40B4-BE49-F238E27FC236}">
+                <a16:creationId xmlns:a16="http://schemas.microsoft.com/office/drawing/2014/main" id="{709EFB4E-A192-4D5B-852C-1D6967805EE2}"/>
+              </a:ext>
+            </a:extLst>
+          </p:cNvPr>
+          <p:cNvSpPr>
+            <a:spLocks noGrp="1"/>
+          </p:cNvSpPr>
+          <p:nvPr>
+            <p:ph type="title"/>
+          </p:nvPr>
+        </p:nvSpPr>
+        <p:spPr/>
+        <p:txBody>
+          <a:bodyPr/>
+          <a:lstStyle/>
+          <a:p>
+            <a:r>
+              <a:rPr lang="es-MX" dirty="0"/>
+              <a:t>Para crear un repositorio de </a:t>
+            </a:r>
+            <a:r>
+              <a:rPr lang="es-MX" dirty="0" err="1"/>
+              <a:t>git</a:t>
+            </a:r>
+            <a:endParaRPr lang="es-ES" dirty="0"/>
+          </a:p>
+        </p:txBody>
+      </p:sp>
+      <p:sp>
+        <p:nvSpPr>
+          <p:cNvPr id="3" name="Content Placeholder 2">
+            <a:extLst>
+              <a:ext uri="{FF2B5EF4-FFF2-40B4-BE49-F238E27FC236}">
+                <a16:creationId xmlns:a16="http://schemas.microsoft.com/office/drawing/2014/main" id="{A2815A87-2998-4F05-81AA-D89F6F50FB0D}"/>
+              </a:ext>
+            </a:extLst>
+          </p:cNvPr>
+          <p:cNvSpPr>
+            <a:spLocks noGrp="1"/>
+          </p:cNvSpPr>
+          <p:nvPr>
+            <p:ph idx="1"/>
+          </p:nvPr>
+        </p:nvSpPr>
+        <p:spPr/>
+        <p:txBody>
+          <a:bodyPr/>
+          <a:lstStyle/>
+          <a:p>
+            <a:r>
+              <a:rPr lang="es-MX" dirty="0"/>
+              <a:t>Acceder a la carpeta donde está el proyecto en el que usaremos Git en una terminal</a:t>
+            </a:r>
+          </a:p>
+          <a:p>
+            <a:pPr lvl="1"/>
+            <a:r>
+              <a:rPr lang="es-MX" dirty="0"/>
+              <a:t>Usar comandos </a:t>
+            </a:r>
+            <a:r>
+              <a:rPr lang="es-MX" dirty="0" err="1"/>
+              <a:t>ls</a:t>
+            </a:r>
+            <a:r>
+              <a:rPr lang="es-MX" dirty="0"/>
+              <a:t> (o </a:t>
+            </a:r>
+            <a:r>
+              <a:rPr lang="es-MX" dirty="0" err="1"/>
+              <a:t>dir</a:t>
+            </a:r>
+            <a:r>
+              <a:rPr lang="es-MX" dirty="0"/>
+              <a:t> en Windows) y cd</a:t>
+            </a:r>
+          </a:p>
+          <a:p>
+            <a:pPr lvl="1"/>
+            <a:endParaRPr lang="es-MX" dirty="0"/>
+          </a:p>
+          <a:p>
+            <a:r>
+              <a:rPr lang="es-MX" dirty="0"/>
+              <a:t>Escribir en la terminal el siguiente comando</a:t>
+            </a:r>
+          </a:p>
+          <a:p>
+            <a:pPr lvl="1"/>
+            <a:r>
+              <a:rPr lang="es-MX" dirty="0" err="1">
+                <a:latin typeface="Consolas" panose="020B0609020204030204" pitchFamily="49" charset="0"/>
+              </a:rPr>
+              <a:t>git</a:t>
+            </a:r>
+            <a:r>
+              <a:rPr lang="es-MX" dirty="0">
+                <a:latin typeface="Consolas" panose="020B0609020204030204" pitchFamily="49" charset="0"/>
+              </a:rPr>
+              <a:t> </a:t>
+            </a:r>
+            <a:r>
+              <a:rPr lang="es-MX" dirty="0" err="1">
+                <a:latin typeface="Consolas" panose="020B0609020204030204" pitchFamily="49" charset="0"/>
+              </a:rPr>
+              <a:t>init</a:t>
+            </a:r>
+            <a:endParaRPr lang="es-MX" dirty="0"/>
+          </a:p>
+          <a:p>
+            <a:endParaRPr lang="es-MX" dirty="0"/>
+          </a:p>
+          <a:p>
+            <a:r>
+              <a:rPr lang="es-MX" dirty="0"/>
+              <a:t>Verificar que se halla creado el repositorio</a:t>
+            </a:r>
+          </a:p>
+          <a:p>
+            <a:pPr lvl="1"/>
+            <a:r>
+              <a:rPr lang="es-MX" dirty="0"/>
+              <a:t>Buscar la carpeta .</a:t>
+            </a:r>
+            <a:r>
+              <a:rPr lang="es-MX" dirty="0" err="1"/>
+              <a:t>git</a:t>
+            </a:r>
+            <a:endParaRPr lang="es-MX" dirty="0"/>
+          </a:p>
+          <a:p>
+            <a:pPr lvl="1"/>
+            <a:r>
+              <a:rPr lang="es-MX" dirty="0"/>
+              <a:t>Ejecutar el comando </a:t>
+            </a:r>
+            <a:r>
+              <a:rPr lang="es-MX" dirty="0" err="1">
+                <a:latin typeface="Consolas" panose="020B0609020204030204" pitchFamily="49" charset="0"/>
+              </a:rPr>
+              <a:t>git</a:t>
+            </a:r>
+            <a:r>
+              <a:rPr lang="es-MX" dirty="0">
+                <a:latin typeface="Consolas" panose="020B0609020204030204" pitchFamily="49" charset="0"/>
+              </a:rPr>
+              <a:t> status</a:t>
+            </a:r>
+            <a:endParaRPr lang="es-MX" dirty="0"/>
+          </a:p>
+        </p:txBody>
+      </p:sp>
+    </p:spTree>
+    <p:extLst>
+      <p:ext uri="{BB962C8B-B14F-4D97-AF65-F5344CB8AC3E}">
+        <p14:creationId xmlns:p14="http://schemas.microsoft.com/office/powerpoint/2010/main" val="1774795632"/>
+      </p:ext>
+    </p:extLst>
+  </p:cSld>
+  <p:clrMapOvr>
+    <a:masterClrMapping/>
+  </p:clrMapOvr>
+</p:sld>
+</file>
+
+<file path=ppt/slides/slide23.xml><?xml version="1.0" encoding="utf-8"?>
+<p:sld xmlns:a="http://schemas.openxmlformats.org/drawingml/2006/main" xmlns:r="http://schemas.openxmlformats.org/officeDocument/2006/relationships" xmlns:p="http://schemas.openxmlformats.org/presentationml/2006/main">
+  <p:cSld>
+    <p:spTree>
+      <p:nvGrpSpPr>
+        <p:cNvPr id="1" name=""/>
+        <p:cNvGrpSpPr/>
+        <p:nvPr/>
+      </p:nvGrpSpPr>
+      <p:grpSpPr>
+        <a:xfrm>
+          <a:off x="0" y="0"/>
+          <a:ext cx="0" cy="0"/>
+          <a:chOff x="0" y="0"/>
+          <a:chExt cx="0" cy="0"/>
+        </a:xfrm>
+      </p:grpSpPr>
+      <p:sp>
+        <p:nvSpPr>
+          <p:cNvPr id="2" name="Title 1">
+            <a:extLst>
+              <a:ext uri="{FF2B5EF4-FFF2-40B4-BE49-F238E27FC236}">
+                <a16:creationId xmlns:a16="http://schemas.microsoft.com/office/drawing/2014/main" id="{72592B2D-D51D-4D69-9E04-0C0FE076ECEB}"/>
+              </a:ext>
+            </a:extLst>
+          </p:cNvPr>
+          <p:cNvSpPr>
+            <a:spLocks noGrp="1"/>
+          </p:cNvSpPr>
+          <p:nvPr>
+            <p:ph type="title"/>
+          </p:nvPr>
+        </p:nvSpPr>
+        <p:spPr/>
+        <p:txBody>
+          <a:bodyPr/>
+          <a:lstStyle/>
+          <a:p>
+            <a:r>
+              <a:rPr lang="es-MX" dirty="0"/>
+              <a:t>Cr</a:t>
+            </a:r>
+            <a:r>
+              <a:rPr lang="es-ES" dirty="0"/>
+              <a:t>é</a:t>
+            </a:r>
+            <a:r>
+              <a:rPr lang="es-MX" dirty="0"/>
+              <a:t>ditos</a:t>
+            </a:r>
+            <a:endParaRPr lang="es-ES" dirty="0"/>
+          </a:p>
+        </p:txBody>
+      </p:sp>
+      <p:sp>
+        <p:nvSpPr>
+          <p:cNvPr id="3" name="Content Placeholder 2">
+            <a:extLst>
+              <a:ext uri="{FF2B5EF4-FFF2-40B4-BE49-F238E27FC236}">
+                <a16:creationId xmlns:a16="http://schemas.microsoft.com/office/drawing/2014/main" id="{A03674EB-0126-4F4B-B807-D1B777E51FFF}"/>
+              </a:ext>
+            </a:extLst>
+          </p:cNvPr>
+          <p:cNvSpPr>
+            <a:spLocks noGrp="1"/>
+          </p:cNvSpPr>
+          <p:nvPr>
+            <p:ph idx="1"/>
+          </p:nvPr>
+        </p:nvSpPr>
+        <p:spPr/>
+        <p:txBody>
+          <a:bodyPr/>
+          <a:lstStyle/>
+          <a:p>
+            <a:r>
+              <a:rPr lang="es-MX" dirty="0"/>
+              <a:t>Diagramas de Git de Scott Chacon en su libro Pro Git</a:t>
+            </a:r>
+          </a:p>
+          <a:p>
+            <a:pPr marL="0" indent="0">
+              <a:buNone/>
+            </a:pPr>
+            <a:endParaRPr lang="es-MX" dirty="0"/>
+          </a:p>
+        </p:txBody>
+      </p:sp>
+    </p:spTree>
+    <p:extLst>
+      <p:ext uri="{BB962C8B-B14F-4D97-AF65-F5344CB8AC3E}">
+        <p14:creationId xmlns:p14="http://schemas.microsoft.com/office/powerpoint/2010/main" val="3928810070"/>
+      </p:ext>
+    </p:extLst>
+  </p:cSld>
+  <p:clrMapOvr>
+    <a:masterClrMapping/>
+  </p:clrMapOvr>
+</p:sld>
+</file>
+
+<file path=ppt/slides/slide3.xml><?xml version="1.0" encoding="utf-8"?>
+<p:sld xmlns:a="http://schemas.openxmlformats.org/drawingml/2006/main" xmlns:r="http://schemas.openxmlformats.org/officeDocument/2006/relationships" xmlns:p="http://schemas.openxmlformats.org/presentationml/2006/main">
+  <p:cSld>
+    <p:spTree>
+      <p:nvGrpSpPr>
+        <p:cNvPr id="1" name=""/>
+        <p:cNvGrpSpPr/>
+        <p:nvPr/>
+      </p:nvGrpSpPr>
+      <p:grpSpPr>
+        <a:xfrm>
+          <a:off x="0" y="0"/>
+          <a:ext cx="0" cy="0"/>
+          <a:chOff x="0" y="0"/>
+          <a:chExt cx="0" cy="0"/>
+        </a:xfrm>
+      </p:grpSpPr>
+      <p:sp>
+        <p:nvSpPr>
+          <p:cNvPr id="2" name="Title 1">
+            <a:extLst>
+              <a:ext uri="{FF2B5EF4-FFF2-40B4-BE49-F238E27FC236}">
                 <a16:creationId xmlns:a16="http://schemas.microsoft.com/office/drawing/2014/main" id="{E45257A9-C129-4354-BF23-4920BB26A7D5}"/>
               </a:ext>
             </a:extLst>
@@ -5036,15 +5695,6 @@
         <p:txBody>
           <a:bodyPr numCol="2"/>
           <a:lstStyle/>
-          <a:p>
-            <a:r>
-              <a:rPr lang="es-MX" dirty="0"/>
-              <a:t>Somos  Micrfosoft Intern  Ambassadors que realizaremos diferentes actividades durante el semestre.</a:t>
-            </a:r>
-          </a:p>
-          <a:p>
-            <a:endParaRPr lang="es-MX" dirty="0"/>
-          </a:p>
           <a:p>
             <a:r>
               <a:rPr lang="es-MX" dirty="0"/>
@@ -5111,379 +5761,7 @@
 </p:sld>
 </file>
 
-<file path=ppt/slides/slide20.xml><?xml version="1.0" encoding="utf-8"?>
-<p:sld xmlns:a="http://schemas.openxmlformats.org/drawingml/2006/main" xmlns:r="http://schemas.openxmlformats.org/officeDocument/2006/relationships" xmlns:p="http://schemas.openxmlformats.org/presentationml/2006/main">
-  <p:cSld>
-    <p:spTree>
-      <p:nvGrpSpPr>
-        <p:cNvPr id="1" name=""/>
-        <p:cNvGrpSpPr/>
-        <p:nvPr/>
-      </p:nvGrpSpPr>
-      <p:grpSpPr>
-        <a:xfrm>
-          <a:off x="0" y="0"/>
-          <a:ext cx="0" cy="0"/>
-          <a:chOff x="0" y="0"/>
-          <a:chExt cx="0" cy="0"/>
-        </a:xfrm>
-      </p:grpSpPr>
-      <p:sp>
-        <p:nvSpPr>
-          <p:cNvPr id="2" name="Title 1">
-            <a:extLst>
-              <a:ext uri="{FF2B5EF4-FFF2-40B4-BE49-F238E27FC236}">
-                <a16:creationId xmlns:a16="http://schemas.microsoft.com/office/drawing/2014/main" id="{B7B07886-2075-4C24-B7CB-D5CC48E045CC}"/>
-              </a:ext>
-            </a:extLst>
-          </p:cNvPr>
-          <p:cNvSpPr>
-            <a:spLocks noGrp="1"/>
-          </p:cNvSpPr>
-          <p:nvPr>
-            <p:ph type="title"/>
-          </p:nvPr>
-        </p:nvSpPr>
-        <p:spPr/>
-        <p:txBody>
-          <a:bodyPr/>
-          <a:lstStyle/>
-          <a:p>
-            <a:r>
-              <a:rPr lang="es-MX" dirty="0"/>
-              <a:t>Mi primer repositorio</a:t>
-            </a:r>
-            <a:endParaRPr lang="es-ES" dirty="0"/>
-          </a:p>
-        </p:txBody>
-      </p:sp>
-      <p:sp>
-        <p:nvSpPr>
-          <p:cNvPr id="3" name="Text Placeholder 2">
-            <a:extLst>
-              <a:ext uri="{FF2B5EF4-FFF2-40B4-BE49-F238E27FC236}">
-                <a16:creationId xmlns:a16="http://schemas.microsoft.com/office/drawing/2014/main" id="{056B03C7-9F6A-45CC-A33C-D7DD8CD7ADCE}"/>
-              </a:ext>
-            </a:extLst>
-          </p:cNvPr>
-          <p:cNvSpPr>
-            <a:spLocks noGrp="1"/>
-          </p:cNvSpPr>
-          <p:nvPr>
-            <p:ph type="body" idx="1"/>
-          </p:nvPr>
-        </p:nvSpPr>
-        <p:spPr/>
-        <p:txBody>
-          <a:bodyPr/>
-          <a:lstStyle/>
-          <a:p>
-            <a:endParaRPr lang="es-ES" dirty="0"/>
-          </a:p>
-        </p:txBody>
-      </p:sp>
-    </p:spTree>
-    <p:extLst>
-      <p:ext uri="{BB962C8B-B14F-4D97-AF65-F5344CB8AC3E}">
-        <p14:creationId xmlns:p14="http://schemas.microsoft.com/office/powerpoint/2010/main" val="3454260894"/>
-      </p:ext>
-    </p:extLst>
-  </p:cSld>
-  <p:clrMapOvr>
-    <a:masterClrMapping/>
-  </p:clrMapOvr>
-</p:sld>
-</file>
-
-<file path=ppt/slides/slide21.xml><?xml version="1.0" encoding="utf-8"?>
-<p:sld xmlns:a="http://schemas.openxmlformats.org/drawingml/2006/main" xmlns:r="http://schemas.openxmlformats.org/officeDocument/2006/relationships" xmlns:p="http://schemas.openxmlformats.org/presentationml/2006/main">
-  <p:cSld>
-    <p:spTree>
-      <p:nvGrpSpPr>
-        <p:cNvPr id="1" name=""/>
-        <p:cNvGrpSpPr/>
-        <p:nvPr/>
-      </p:nvGrpSpPr>
-      <p:grpSpPr>
-        <a:xfrm>
-          <a:off x="0" y="0"/>
-          <a:ext cx="0" cy="0"/>
-          <a:chOff x="0" y="0"/>
-          <a:chExt cx="0" cy="0"/>
-        </a:xfrm>
-      </p:grpSpPr>
-      <p:sp>
-        <p:nvSpPr>
-          <p:cNvPr id="2" name="Title 1">
-            <a:extLst>
-              <a:ext uri="{FF2B5EF4-FFF2-40B4-BE49-F238E27FC236}">
-                <a16:creationId xmlns:a16="http://schemas.microsoft.com/office/drawing/2014/main" id="{709EFB4E-A192-4D5B-852C-1D6967805EE2}"/>
-              </a:ext>
-            </a:extLst>
-          </p:cNvPr>
-          <p:cNvSpPr>
-            <a:spLocks noGrp="1"/>
-          </p:cNvSpPr>
-          <p:nvPr>
-            <p:ph type="title"/>
-          </p:nvPr>
-        </p:nvSpPr>
-        <p:spPr/>
-        <p:txBody>
-          <a:bodyPr/>
-          <a:lstStyle/>
-          <a:p>
-            <a:r>
-              <a:rPr lang="es-MX" dirty="0"/>
-              <a:t>Para crear un repositorio de </a:t>
-            </a:r>
-            <a:r>
-              <a:rPr lang="es-MX" dirty="0" err="1"/>
-              <a:t>git</a:t>
-            </a:r>
-            <a:endParaRPr lang="es-ES" dirty="0"/>
-          </a:p>
-        </p:txBody>
-      </p:sp>
-      <p:sp>
-        <p:nvSpPr>
-          <p:cNvPr id="3" name="Content Placeholder 2">
-            <a:extLst>
-              <a:ext uri="{FF2B5EF4-FFF2-40B4-BE49-F238E27FC236}">
-                <a16:creationId xmlns:a16="http://schemas.microsoft.com/office/drawing/2014/main" id="{A2815A87-2998-4F05-81AA-D89F6F50FB0D}"/>
-              </a:ext>
-            </a:extLst>
-          </p:cNvPr>
-          <p:cNvSpPr>
-            <a:spLocks noGrp="1"/>
-          </p:cNvSpPr>
-          <p:nvPr>
-            <p:ph idx="1"/>
-          </p:nvPr>
-        </p:nvSpPr>
-        <p:spPr/>
-        <p:txBody>
-          <a:bodyPr/>
-          <a:lstStyle/>
-          <a:p>
-            <a:r>
-              <a:rPr lang="es-MX" dirty="0"/>
-              <a:t>Acceder a la carpeta donde está el proyecto en el que usaremos Git en una terminal</a:t>
-            </a:r>
-          </a:p>
-          <a:p>
-            <a:pPr lvl="1"/>
-            <a:r>
-              <a:rPr lang="es-MX" dirty="0"/>
-              <a:t>Usar comandos </a:t>
-            </a:r>
-            <a:r>
-              <a:rPr lang="es-MX" dirty="0" err="1"/>
-              <a:t>ls</a:t>
-            </a:r>
-            <a:r>
-              <a:rPr lang="es-MX" dirty="0"/>
-              <a:t> (o </a:t>
-            </a:r>
-            <a:r>
-              <a:rPr lang="es-MX" dirty="0" err="1"/>
-              <a:t>dir</a:t>
-            </a:r>
-            <a:r>
-              <a:rPr lang="es-MX" dirty="0"/>
-              <a:t> en Windows) y cd</a:t>
-            </a:r>
-          </a:p>
-          <a:p>
-            <a:pPr lvl="1"/>
-            <a:endParaRPr lang="es-MX" dirty="0"/>
-          </a:p>
-          <a:p>
-            <a:r>
-              <a:rPr lang="es-MX" dirty="0"/>
-              <a:t>Escribir en la terminal el siguiente comando</a:t>
-            </a:r>
-          </a:p>
-          <a:p>
-            <a:pPr lvl="1"/>
-            <a:r>
-              <a:rPr lang="es-MX" dirty="0" err="1">
-                <a:latin typeface="Consolas" panose="020B0609020204030204" pitchFamily="49" charset="0"/>
-              </a:rPr>
-              <a:t>git</a:t>
-            </a:r>
-            <a:r>
-              <a:rPr lang="es-MX" dirty="0">
-                <a:latin typeface="Consolas" panose="020B0609020204030204" pitchFamily="49" charset="0"/>
-              </a:rPr>
-              <a:t> </a:t>
-            </a:r>
-            <a:r>
-              <a:rPr lang="es-MX" dirty="0" err="1">
-                <a:latin typeface="Consolas" panose="020B0609020204030204" pitchFamily="49" charset="0"/>
-              </a:rPr>
-              <a:t>init</a:t>
-            </a:r>
-            <a:endParaRPr lang="es-MX" dirty="0"/>
-          </a:p>
-          <a:p>
-            <a:endParaRPr lang="es-MX" dirty="0"/>
-          </a:p>
-          <a:p>
-            <a:r>
-              <a:rPr lang="es-MX" dirty="0"/>
-              <a:t>Verificar que se halla creado el repositorio</a:t>
-            </a:r>
-          </a:p>
-          <a:p>
-            <a:pPr lvl="1"/>
-            <a:r>
-              <a:rPr lang="es-MX" dirty="0"/>
-              <a:t>Buscar la carpeta .</a:t>
-            </a:r>
-            <a:r>
-              <a:rPr lang="es-MX" dirty="0" err="1"/>
-              <a:t>git</a:t>
-            </a:r>
-            <a:endParaRPr lang="es-MX" dirty="0"/>
-          </a:p>
-          <a:p>
-            <a:pPr lvl="1"/>
-            <a:r>
-              <a:rPr lang="es-MX" dirty="0"/>
-              <a:t>Ejecutar el comando </a:t>
-            </a:r>
-            <a:r>
-              <a:rPr lang="es-MX" dirty="0" err="1">
-                <a:latin typeface="Consolas" panose="020B0609020204030204" pitchFamily="49" charset="0"/>
-              </a:rPr>
-              <a:t>git</a:t>
-            </a:r>
-            <a:r>
-              <a:rPr lang="es-MX" dirty="0">
-                <a:latin typeface="Consolas" panose="020B0609020204030204" pitchFamily="49" charset="0"/>
-              </a:rPr>
-              <a:t> status</a:t>
-            </a:r>
-            <a:endParaRPr lang="es-MX" dirty="0"/>
-          </a:p>
-        </p:txBody>
-      </p:sp>
-    </p:spTree>
-    <p:extLst>
-      <p:ext uri="{BB962C8B-B14F-4D97-AF65-F5344CB8AC3E}">
-        <p14:creationId xmlns:p14="http://schemas.microsoft.com/office/powerpoint/2010/main" val="1774795632"/>
-      </p:ext>
-    </p:extLst>
-  </p:cSld>
-  <p:clrMapOvr>
-    <a:masterClrMapping/>
-  </p:clrMapOvr>
-</p:sld>
-</file>
-
-<file path=ppt/slides/slide22.xml><?xml version="1.0" encoding="utf-8"?>
-<p:sld xmlns:a="http://schemas.openxmlformats.org/drawingml/2006/main" xmlns:r="http://schemas.openxmlformats.org/officeDocument/2006/relationships" xmlns:p="http://schemas.openxmlformats.org/presentationml/2006/main">
-  <p:cSld>
-    <p:spTree>
-      <p:nvGrpSpPr>
-        <p:cNvPr id="1" name=""/>
-        <p:cNvGrpSpPr/>
-        <p:nvPr/>
-      </p:nvGrpSpPr>
-      <p:grpSpPr>
-        <a:xfrm>
-          <a:off x="0" y="0"/>
-          <a:ext cx="0" cy="0"/>
-          <a:chOff x="0" y="0"/>
-          <a:chExt cx="0" cy="0"/>
-        </a:xfrm>
-      </p:grpSpPr>
-      <p:sp>
-        <p:nvSpPr>
-          <p:cNvPr id="2" name="Title 1">
-            <a:extLst>
-              <a:ext uri="{FF2B5EF4-FFF2-40B4-BE49-F238E27FC236}">
-                <a16:creationId xmlns:a16="http://schemas.microsoft.com/office/drawing/2014/main" id="{72592B2D-D51D-4D69-9E04-0C0FE076ECEB}"/>
-              </a:ext>
-            </a:extLst>
-          </p:cNvPr>
-          <p:cNvSpPr>
-            <a:spLocks noGrp="1"/>
-          </p:cNvSpPr>
-          <p:nvPr>
-            <p:ph type="title"/>
-          </p:nvPr>
-        </p:nvSpPr>
-        <p:spPr/>
-        <p:txBody>
-          <a:bodyPr/>
-          <a:lstStyle/>
-          <a:p>
-            <a:r>
-              <a:rPr lang="es-MX" dirty="0"/>
-              <a:t>Cr</a:t>
-            </a:r>
-            <a:r>
-              <a:rPr lang="es-ES" dirty="0"/>
-              <a:t>é</a:t>
-            </a:r>
-            <a:r>
-              <a:rPr lang="es-MX" dirty="0"/>
-              <a:t>ditos</a:t>
-            </a:r>
-            <a:endParaRPr lang="es-ES" dirty="0"/>
-          </a:p>
-        </p:txBody>
-      </p:sp>
-      <p:sp>
-        <p:nvSpPr>
-          <p:cNvPr id="3" name="Content Placeholder 2">
-            <a:extLst>
-              <a:ext uri="{FF2B5EF4-FFF2-40B4-BE49-F238E27FC236}">
-                <a16:creationId xmlns:a16="http://schemas.microsoft.com/office/drawing/2014/main" id="{A03674EB-0126-4F4B-B807-D1B777E51FFF}"/>
-              </a:ext>
-            </a:extLst>
-          </p:cNvPr>
-          <p:cNvSpPr>
-            <a:spLocks noGrp="1"/>
-          </p:cNvSpPr>
-          <p:nvPr>
-            <p:ph idx="1"/>
-          </p:nvPr>
-        </p:nvSpPr>
-        <p:spPr/>
-        <p:txBody>
-          <a:bodyPr/>
-          <a:lstStyle/>
-          <a:p>
-            <a:r>
-              <a:rPr lang="es-MX" dirty="0"/>
-              <a:t>Diagramas de Git de Scott Chacon en su libro Pro Git</a:t>
-            </a:r>
-          </a:p>
-          <a:p>
-            <a:pPr marL="0" indent="0">
-              <a:buNone/>
-            </a:pPr>
-            <a:endParaRPr lang="es-MX" dirty="0"/>
-          </a:p>
-        </p:txBody>
-      </p:sp>
-    </p:spTree>
-    <p:extLst>
-      <p:ext uri="{BB962C8B-B14F-4D97-AF65-F5344CB8AC3E}">
-        <p14:creationId xmlns:p14="http://schemas.microsoft.com/office/powerpoint/2010/main" val="3928810070"/>
-      </p:ext>
-    </p:extLst>
-  </p:cSld>
-  <p:clrMapOvr>
-    <a:masterClrMapping/>
-  </p:clrMapOvr>
-</p:sld>
-</file>
-
-<file path=ppt/slides/slide3.xml><?xml version="1.0" encoding="utf-8"?>
+<file path=ppt/slides/slide4.xml><?xml version="1.0" encoding="utf-8"?>
 <p:sld xmlns:a="http://schemas.openxmlformats.org/drawingml/2006/main" xmlns:r="http://schemas.openxmlformats.org/officeDocument/2006/relationships" xmlns:p="http://schemas.openxmlformats.org/presentationml/2006/main">
   <p:cSld>
     <p:spTree>
@@ -5605,138 +5883,6 @@
 </p:sld>
 </file>
 
-<file path=ppt/slides/slide4.xml><?xml version="1.0" encoding="utf-8"?>
-<p:sld xmlns:a="http://schemas.openxmlformats.org/drawingml/2006/main" xmlns:r="http://schemas.openxmlformats.org/officeDocument/2006/relationships" xmlns:p="http://schemas.openxmlformats.org/presentationml/2006/main">
-  <p:cSld>
-    <p:spTree>
-      <p:nvGrpSpPr>
-        <p:cNvPr id="1" name=""/>
-        <p:cNvGrpSpPr/>
-        <p:nvPr/>
-      </p:nvGrpSpPr>
-      <p:grpSpPr>
-        <a:xfrm>
-          <a:off x="0" y="0"/>
-          <a:ext cx="0" cy="0"/>
-          <a:chOff x="0" y="0"/>
-          <a:chExt cx="0" cy="0"/>
-        </a:xfrm>
-      </p:grpSpPr>
-      <p:sp>
-        <p:nvSpPr>
-          <p:cNvPr id="2" name="Title 1">
-            <a:extLst>
-              <a:ext uri="{FF2B5EF4-FFF2-40B4-BE49-F238E27FC236}">
-                <a16:creationId xmlns:a16="http://schemas.microsoft.com/office/drawing/2014/main" id="{8EFC495D-9389-4346-A995-F5C40163EC22}"/>
-              </a:ext>
-            </a:extLst>
-          </p:cNvPr>
-          <p:cNvSpPr>
-            <a:spLocks noGrp="1"/>
-          </p:cNvSpPr>
-          <p:nvPr>
-            <p:ph type="title"/>
-          </p:nvPr>
-        </p:nvSpPr>
-        <p:spPr/>
-        <p:txBody>
-          <a:bodyPr/>
-          <a:lstStyle/>
-          <a:p>
-            <a:r>
-              <a:rPr lang="es-MX" dirty="0"/>
-              <a:t>Objetivos del taller</a:t>
-            </a:r>
-            <a:endParaRPr lang="es-ES" dirty="0"/>
-          </a:p>
-        </p:txBody>
-      </p:sp>
-      <p:sp>
-        <p:nvSpPr>
-          <p:cNvPr id="3" name="Content Placeholder 2">
-            <a:extLst>
-              <a:ext uri="{FF2B5EF4-FFF2-40B4-BE49-F238E27FC236}">
-                <a16:creationId xmlns:a16="http://schemas.microsoft.com/office/drawing/2014/main" id="{3B83E2C1-8322-4C47-860A-19FDDE422B73}"/>
-              </a:ext>
-            </a:extLst>
-          </p:cNvPr>
-          <p:cNvSpPr>
-            <a:spLocks noGrp="1"/>
-          </p:cNvSpPr>
-          <p:nvPr>
-            <p:ph idx="1"/>
-          </p:nvPr>
-        </p:nvSpPr>
-        <p:spPr/>
-        <p:txBody>
-          <a:bodyPr/>
-          <a:lstStyle/>
-          <a:p>
-            <a:r>
-              <a:rPr lang="es-MX" dirty="0"/>
-              <a:t>Que quienes lo tomen sean capaces de:</a:t>
-            </a:r>
-          </a:p>
-          <a:p>
-            <a:pPr lvl="1"/>
-            <a:endParaRPr lang="es-MX" dirty="0"/>
-          </a:p>
-          <a:p>
-            <a:pPr lvl="1"/>
-            <a:r>
-              <a:rPr lang="es-MX" dirty="0"/>
-              <a:t>Describir qué es Git </a:t>
-            </a:r>
-          </a:p>
-          <a:p>
-            <a:pPr lvl="1"/>
-            <a:endParaRPr lang="es-MX" dirty="0"/>
-          </a:p>
-          <a:p>
-            <a:pPr lvl="1"/>
-            <a:r>
-              <a:rPr lang="es-MX" dirty="0"/>
-              <a:t>Usar las funciones más básicas de Git de forma natural</a:t>
-            </a:r>
-          </a:p>
-          <a:p>
-            <a:pPr lvl="1"/>
-            <a:endParaRPr lang="es-MX" dirty="0"/>
-          </a:p>
-          <a:p>
-            <a:pPr lvl="1"/>
-            <a:r>
-              <a:rPr lang="es-MX" dirty="0"/>
-              <a:t>Conocer las funciones intermedias y avanzadas de Git  y ser capaces de usarlas consultando la documentación</a:t>
-            </a:r>
-          </a:p>
-          <a:p>
-            <a:pPr lvl="1"/>
-            <a:endParaRPr lang="es-MX" dirty="0"/>
-          </a:p>
-          <a:p>
-            <a:pPr lvl="1"/>
-            <a:r>
-              <a:rPr lang="es-MX" dirty="0"/>
-              <a:t>Crear repositorios y trabajar en ellos de manera colaborativa</a:t>
-            </a:r>
-            <a:endParaRPr lang="es-ES" dirty="0"/>
-          </a:p>
-        </p:txBody>
-      </p:sp>
-    </p:spTree>
-    <p:extLst>
-      <p:ext uri="{BB962C8B-B14F-4D97-AF65-F5344CB8AC3E}">
-        <p14:creationId xmlns:p14="http://schemas.microsoft.com/office/powerpoint/2010/main" val="2405316574"/>
-      </p:ext>
-    </p:extLst>
-  </p:cSld>
-  <p:clrMapOvr>
-    <a:masterClrMapping/>
-  </p:clrMapOvr>
-</p:sld>
-</file>
-
 <file path=ppt/slides/slide5.xml><?xml version="1.0" encoding="utf-8"?>
 <p:sld xmlns:a="http://schemas.openxmlformats.org/drawingml/2006/main" xmlns:r="http://schemas.openxmlformats.org/officeDocument/2006/relationships" xmlns:p="http://schemas.openxmlformats.org/presentationml/2006/main">
   <p:cSld>
@@ -5759,6 +5905,138 @@
           <p:cNvPr id="2" name="Title 1">
             <a:extLst>
               <a:ext uri="{FF2B5EF4-FFF2-40B4-BE49-F238E27FC236}">
+                <a16:creationId xmlns:a16="http://schemas.microsoft.com/office/drawing/2014/main" id="{8EFC495D-9389-4346-A995-F5C40163EC22}"/>
+              </a:ext>
+            </a:extLst>
+          </p:cNvPr>
+          <p:cNvSpPr>
+            <a:spLocks noGrp="1"/>
+          </p:cNvSpPr>
+          <p:nvPr>
+            <p:ph type="title"/>
+          </p:nvPr>
+        </p:nvSpPr>
+        <p:spPr/>
+        <p:txBody>
+          <a:bodyPr/>
+          <a:lstStyle/>
+          <a:p>
+            <a:r>
+              <a:rPr lang="es-MX" dirty="0"/>
+              <a:t>Objetivos del taller</a:t>
+            </a:r>
+            <a:endParaRPr lang="es-ES" dirty="0"/>
+          </a:p>
+        </p:txBody>
+      </p:sp>
+      <p:sp>
+        <p:nvSpPr>
+          <p:cNvPr id="3" name="Content Placeholder 2">
+            <a:extLst>
+              <a:ext uri="{FF2B5EF4-FFF2-40B4-BE49-F238E27FC236}">
+                <a16:creationId xmlns:a16="http://schemas.microsoft.com/office/drawing/2014/main" id="{3B83E2C1-8322-4C47-860A-19FDDE422B73}"/>
+              </a:ext>
+            </a:extLst>
+          </p:cNvPr>
+          <p:cNvSpPr>
+            <a:spLocks noGrp="1"/>
+          </p:cNvSpPr>
+          <p:nvPr>
+            <p:ph idx="1"/>
+          </p:nvPr>
+        </p:nvSpPr>
+        <p:spPr/>
+        <p:txBody>
+          <a:bodyPr/>
+          <a:lstStyle/>
+          <a:p>
+            <a:r>
+              <a:rPr lang="es-MX" dirty="0"/>
+              <a:t>Que quienes lo tomen sean capaces de:</a:t>
+            </a:r>
+          </a:p>
+          <a:p>
+            <a:pPr lvl="1"/>
+            <a:endParaRPr lang="es-MX" dirty="0"/>
+          </a:p>
+          <a:p>
+            <a:pPr lvl="1"/>
+            <a:r>
+              <a:rPr lang="es-MX" dirty="0"/>
+              <a:t>Describir qué es Git </a:t>
+            </a:r>
+          </a:p>
+          <a:p>
+            <a:pPr lvl="1"/>
+            <a:endParaRPr lang="es-MX" dirty="0"/>
+          </a:p>
+          <a:p>
+            <a:pPr lvl="1"/>
+            <a:r>
+              <a:rPr lang="es-MX" dirty="0"/>
+              <a:t>Usar las funciones más básicas de Git de forma natural</a:t>
+            </a:r>
+          </a:p>
+          <a:p>
+            <a:pPr lvl="1"/>
+            <a:endParaRPr lang="es-MX" dirty="0"/>
+          </a:p>
+          <a:p>
+            <a:pPr lvl="1"/>
+            <a:r>
+              <a:rPr lang="es-MX" dirty="0"/>
+              <a:t>Conocer las funciones intermedias y avanzadas de Git  y ser capaces de usarlas consultando la documentación</a:t>
+            </a:r>
+          </a:p>
+          <a:p>
+            <a:pPr lvl="1"/>
+            <a:endParaRPr lang="es-MX" dirty="0"/>
+          </a:p>
+          <a:p>
+            <a:pPr lvl="1"/>
+            <a:r>
+              <a:rPr lang="es-MX" dirty="0"/>
+              <a:t>Crear repositorios y trabajar en ellos de manera colaborativa</a:t>
+            </a:r>
+            <a:endParaRPr lang="es-ES" dirty="0"/>
+          </a:p>
+        </p:txBody>
+      </p:sp>
+    </p:spTree>
+    <p:extLst>
+      <p:ext uri="{BB962C8B-B14F-4D97-AF65-F5344CB8AC3E}">
+        <p14:creationId xmlns:p14="http://schemas.microsoft.com/office/powerpoint/2010/main" val="2405316574"/>
+      </p:ext>
+    </p:extLst>
+  </p:cSld>
+  <p:clrMapOvr>
+    <a:masterClrMapping/>
+  </p:clrMapOvr>
+</p:sld>
+</file>
+
+<file path=ppt/slides/slide6.xml><?xml version="1.0" encoding="utf-8"?>
+<p:sld xmlns:a="http://schemas.openxmlformats.org/drawingml/2006/main" xmlns:r="http://schemas.openxmlformats.org/officeDocument/2006/relationships" xmlns:p="http://schemas.openxmlformats.org/presentationml/2006/main">
+  <p:cSld>
+    <p:spTree>
+      <p:nvGrpSpPr>
+        <p:cNvPr id="1" name=""/>
+        <p:cNvGrpSpPr/>
+        <p:nvPr/>
+      </p:nvGrpSpPr>
+      <p:grpSpPr>
+        <a:xfrm>
+          <a:off x="0" y="0"/>
+          <a:ext cx="0" cy="0"/>
+          <a:chOff x="0" y="0"/>
+          <a:chExt cx="0" cy="0"/>
+        </a:xfrm>
+      </p:grpSpPr>
+      <p:sp>
+        <p:nvSpPr>
+          <p:cNvPr id="2" name="Title 1">
+            <a:extLst>
+              <a:ext uri="{FF2B5EF4-FFF2-40B4-BE49-F238E27FC236}">
                 <a16:creationId xmlns:a16="http://schemas.microsoft.com/office/drawing/2014/main" id="{BC94763D-BF3B-4E2B-876B-FB289BA2D5E5}"/>
               </a:ext>
             </a:extLst>
@@ -5807,7 +6085,7 @@
         </p:spPr>
         <p:txBody>
           <a:bodyPr>
-            <a:normAutofit fontScale="92500" lnSpcReduction="20000"/>
+            <a:normAutofit/>
           </a:bodyPr>
           <a:lstStyle/>
           <a:p>
@@ -5817,6 +6095,9 @@
             </a:r>
           </a:p>
           <a:p>
+            <a:pPr marL="0" indent="0">
+              <a:buNone/>
+            </a:pPr>
             <a:endParaRPr lang="es-MX" dirty="0"/>
           </a:p>
           <a:p>
@@ -5850,37 +6131,7 @@
             <a:pPr lvl="1"/>
             <a:r>
               <a:rPr lang="es-MX" dirty="0"/>
-              <a:t>ing.pue.itesm.mx/</a:t>
-            </a:r>
-            <a:r>
-              <a:rPr lang="es-MX" dirty="0" err="1"/>
-              <a:t>iam</a:t>
-            </a:r>
-            <a:r>
-              <a:rPr lang="es-MX" dirty="0"/>
-              <a:t>/</a:t>
-            </a:r>
-            <a:r>
-              <a:rPr lang="es-MX" dirty="0" err="1"/>
-              <a:t>git</a:t>
-            </a:r>
-            <a:endParaRPr lang="es-MX" dirty="0"/>
-          </a:p>
-          <a:p>
-            <a:pPr lvl="1"/>
-            <a:endParaRPr lang="es-MX" dirty="0"/>
-          </a:p>
-          <a:p>
-            <a:r>
-              <a:rPr lang="es-MX" dirty="0"/>
-              <a:t>Por favor hagan una cuenta en github.com y envíen el usuario a:</a:t>
-            </a:r>
-          </a:p>
-          <a:p>
-            <a:pPr lvl="1"/>
-            <a:r>
-              <a:rPr lang="es-MX" dirty="0"/>
-              <a:t>rikyfocil@outlook.com (Mencionen el taller en el correo, por favor)</a:t>
+              <a:t>https://github.com/ChavaO777/presentaciones-iam</a:t>
             </a:r>
           </a:p>
         </p:txBody>
@@ -5913,8 +6164,8 @@
         </p:blipFill>
         <p:spPr>
           <a:xfrm>
-            <a:off x="4739121" y="5578089"/>
-            <a:ext cx="2711676" cy="1279911"/>
+            <a:off x="4985407" y="5631679"/>
+            <a:ext cx="2219104" cy="1047417"/>
           </a:xfrm>
           <a:prstGeom prst="rect">
             <a:avLst/>
@@ -5934,7 +6185,7 @@
 </p:sld>
 </file>
 
-<file path=ppt/slides/slide6.xml><?xml version="1.0" encoding="utf-8"?>
+<file path=ppt/slides/slide7.xml><?xml version="1.0" encoding="utf-8"?>
 <p:sld xmlns:a="http://schemas.openxmlformats.org/drawingml/2006/main" xmlns:r="http://schemas.openxmlformats.org/officeDocument/2006/relationships" xmlns:p="http://schemas.openxmlformats.org/presentationml/2006/main">
   <p:cSld>
     <p:bg>
@@ -6072,20 +6323,21 @@
           </a:p>
           <a:p>
             <a:r>
-              <a:rPr lang="es-MX" dirty="0">
-                <a:hlinkClick r:id="rId2">
-                  <a:extLst>
-                    <a:ext uri="{A12FA001-AC4F-418D-AE19-62706E023703}">
-                      <ahyp:hlinkClr xmlns:ahyp="http://schemas.microsoft.com/office/drawing/2018/hyperlinkcolor" val="tx"/>
-                    </a:ext>
-                  </a:extLst>
-                </a:hlinkClick>
-              </a:rPr>
-              <a:t>https://www.udacity.com/course/how-to-use-git-and-github--ud775</a:t>
-            </a:r>
-            <a:endParaRPr lang="es-MX" dirty="0"/>
-          </a:p>
-          <a:p>
+              <a:rPr lang="en-US" dirty="0"/>
+              <a:t>https://</a:t>
+            </a:r>
+            <a:r>
+              <a:rPr lang="en-US" dirty="0" err="1"/>
+              <a:t>goo.gl</a:t>
+            </a:r>
+            <a:r>
+              <a:rPr lang="en-US" dirty="0"/>
+              <a:t>/</a:t>
+            </a:r>
+            <a:r>
+              <a:rPr lang="en-US" dirty="0" err="1"/>
+              <a:t>iCqpEc</a:t>
+            </a:r>
             <a:endParaRPr lang="es-ES" dirty="0">
               <a:latin typeface="Consolas" panose="020B0609020204030204" pitchFamily="49" charset="0"/>
             </a:endParaRPr>
@@ -6203,7 +6455,7 @@
 </p:sld>
 </file>
 
-<file path=ppt/slides/slide7.xml><?xml version="1.0" encoding="utf-8"?>
+<file path=ppt/slides/slide8.xml><?xml version="1.0" encoding="utf-8"?>
 <p:sld xmlns:a="http://schemas.openxmlformats.org/drawingml/2006/main" xmlns:r="http://schemas.openxmlformats.org/officeDocument/2006/relationships" xmlns:p="http://schemas.openxmlformats.org/presentationml/2006/main">
   <p:cSld>
     <p:spTree>
@@ -6401,112 +6653,6 @@
 </p:sld>
 </file>
 
-<file path=ppt/slides/slide8.xml><?xml version="1.0" encoding="utf-8"?>
-<p:sld xmlns:a="http://schemas.openxmlformats.org/drawingml/2006/main" xmlns:r="http://schemas.openxmlformats.org/officeDocument/2006/relationships" xmlns:p="http://schemas.openxmlformats.org/presentationml/2006/main">
-  <p:cSld>
-    <p:spTree>
-      <p:nvGrpSpPr>
-        <p:cNvPr id="1" name=""/>
-        <p:cNvGrpSpPr/>
-        <p:nvPr/>
-      </p:nvGrpSpPr>
-      <p:grpSpPr>
-        <a:xfrm>
-          <a:off x="0" y="0"/>
-          <a:ext cx="0" cy="0"/>
-          <a:chOff x="0" y="0"/>
-          <a:chExt cx="0" cy="0"/>
-        </a:xfrm>
-      </p:grpSpPr>
-      <p:sp>
-        <p:nvSpPr>
-          <p:cNvPr id="2" name="Title 1">
-            <a:extLst>
-              <a:ext uri="{FF2B5EF4-FFF2-40B4-BE49-F238E27FC236}">
-                <a16:creationId xmlns:a16="http://schemas.microsoft.com/office/drawing/2014/main" id="{0D5BED20-5293-412C-B8B1-95A5C772ECB0}"/>
-              </a:ext>
-            </a:extLst>
-          </p:cNvPr>
-          <p:cNvSpPr>
-            <a:spLocks noGrp="1"/>
-          </p:cNvSpPr>
-          <p:nvPr>
-            <p:ph type="title"/>
-          </p:nvPr>
-        </p:nvSpPr>
-        <p:spPr/>
-        <p:txBody>
-          <a:bodyPr/>
-          <a:lstStyle/>
-          <a:p>
-            <a:r>
-              <a:rPr lang="es-MX" dirty="0"/>
-              <a:t>Objetivo de esta sesión</a:t>
-            </a:r>
-            <a:endParaRPr lang="es-ES" dirty="0"/>
-          </a:p>
-        </p:txBody>
-      </p:sp>
-      <p:sp>
-        <p:nvSpPr>
-          <p:cNvPr id="3" name="Content Placeholder 2">
-            <a:extLst>
-              <a:ext uri="{FF2B5EF4-FFF2-40B4-BE49-F238E27FC236}">
-                <a16:creationId xmlns:a16="http://schemas.microsoft.com/office/drawing/2014/main" id="{F5DFA738-B485-4BE0-92AC-F2F0FBE37169}"/>
-              </a:ext>
-            </a:extLst>
-          </p:cNvPr>
-          <p:cNvSpPr>
-            <a:spLocks noGrp="1"/>
-          </p:cNvSpPr>
-          <p:nvPr>
-            <p:ph idx="1"/>
-          </p:nvPr>
-        </p:nvSpPr>
-        <p:spPr/>
-        <p:txBody>
-          <a:bodyPr/>
-          <a:lstStyle/>
-          <a:p>
-            <a:r>
-              <a:rPr lang="es-MX" dirty="0"/>
-              <a:t>Que todos tengan Git instalado y corriendo</a:t>
-            </a:r>
-          </a:p>
-          <a:p>
-            <a:endParaRPr lang="es-MX" dirty="0"/>
-          </a:p>
-          <a:p>
-            <a:r>
-              <a:rPr lang="es-MX" dirty="0"/>
-              <a:t>Saber los aspectos más básicos de Git</a:t>
-            </a:r>
-          </a:p>
-          <a:p>
-            <a:endParaRPr lang="es-MX" dirty="0"/>
-          </a:p>
-          <a:p>
-            <a:r>
-              <a:rPr lang="es-MX" dirty="0"/>
-              <a:t>Saber crear un repositorio de Git</a:t>
-            </a:r>
-            <a:endParaRPr lang="es-ES" dirty="0"/>
-          </a:p>
-        </p:txBody>
-      </p:sp>
-    </p:spTree>
-    <p:extLst>
-      <p:ext uri="{BB962C8B-B14F-4D97-AF65-F5344CB8AC3E}">
-        <p14:creationId xmlns:p14="http://schemas.microsoft.com/office/powerpoint/2010/main" val="3665162392"/>
-      </p:ext>
-    </p:extLst>
-  </p:cSld>
-  <p:clrMapOvr>
-    <a:masterClrMapping/>
-  </p:clrMapOvr>
-</p:sld>
-</file>
-
 <file path=ppt/slides/slide9.xml><?xml version="1.0" encoding="utf-8"?>
 <p:sld xmlns:a="http://schemas.openxmlformats.org/drawingml/2006/main" xmlns:r="http://schemas.openxmlformats.org/officeDocument/2006/relationships" xmlns:p="http://schemas.openxmlformats.org/presentationml/2006/main">
   <p:cSld>
@@ -6526,136 +6672,84 @@
       </p:grpSpPr>
       <p:sp>
         <p:nvSpPr>
-          <p:cNvPr id="2" name="Rectangle 1">
+          <p:cNvPr id="2" name="Title 1">
             <a:extLst>
               <a:ext uri="{FF2B5EF4-FFF2-40B4-BE49-F238E27FC236}">
-                <a16:creationId xmlns:a16="http://schemas.microsoft.com/office/drawing/2014/main" id="{168A70A8-2DB8-4049-BF18-F0B4E70EFC62}"/>
+                <a16:creationId xmlns:a16="http://schemas.microsoft.com/office/drawing/2014/main" id="{0D5BED20-5293-412C-B8B1-95A5C772ECB0}"/>
               </a:ext>
             </a:extLst>
           </p:cNvPr>
-          <p:cNvSpPr/>
-          <p:nvPr/>
-        </p:nvSpPr>
-        <p:spPr>
-          <a:xfrm>
-            <a:off x="0" y="2286001"/>
-            <a:ext cx="12192000" cy="2171700"/>
-          </a:xfrm>
-          <a:prstGeom prst="rect">
-            <a:avLst/>
-          </a:prstGeom>
-          <a:solidFill>
-            <a:schemeClr val="tx1"/>
-          </a:solidFill>
-        </p:spPr>
-        <p:style>
-          <a:lnRef idx="2">
-            <a:schemeClr val="accent1">
-              <a:shade val="50000"/>
-            </a:schemeClr>
-          </a:lnRef>
-          <a:fillRef idx="1">
-            <a:schemeClr val="accent1"/>
-          </a:fillRef>
-          <a:effectRef idx="0">
-            <a:schemeClr val="accent1"/>
-          </a:effectRef>
-          <a:fontRef idx="minor">
-            <a:schemeClr val="lt1"/>
-          </a:fontRef>
-        </p:style>
-        <p:txBody>
-          <a:bodyPr rtlCol="0" anchor="ctr"/>
-          <a:lstStyle/>
-          <a:p>
-            <a:pPr algn="ctr"/>
+          <p:cNvSpPr>
+            <a:spLocks noGrp="1"/>
+          </p:cNvSpPr>
+          <p:nvPr>
+            <p:ph type="title"/>
+          </p:nvPr>
+        </p:nvSpPr>
+        <p:spPr/>
+        <p:txBody>
+          <a:bodyPr/>
+          <a:lstStyle/>
+          <a:p>
+            <a:r>
+              <a:rPr lang="es-MX" dirty="0"/>
+              <a:t>Objetivo de esta sesión</a:t>
+            </a:r>
             <a:endParaRPr lang="es-ES" dirty="0"/>
           </a:p>
         </p:txBody>
       </p:sp>
       <p:sp>
         <p:nvSpPr>
-          <p:cNvPr id="3" name="Rectangle 2">
+          <p:cNvPr id="3" name="Content Placeholder 2">
             <a:extLst>
               <a:ext uri="{FF2B5EF4-FFF2-40B4-BE49-F238E27FC236}">
-                <a16:creationId xmlns:a16="http://schemas.microsoft.com/office/drawing/2014/main" id="{80AF0E4D-199B-426E-A55A-DA62FF2789C7}"/>
+                <a16:creationId xmlns:a16="http://schemas.microsoft.com/office/drawing/2014/main" id="{F5DFA738-B485-4BE0-92AC-F2F0FBE37169}"/>
               </a:ext>
             </a:extLst>
           </p:cNvPr>
-          <p:cNvSpPr/>
-          <p:nvPr/>
-        </p:nvSpPr>
-        <p:spPr>
-          <a:xfrm>
-            <a:off x="2795417" y="2513494"/>
-            <a:ext cx="6601166" cy="1446550"/>
-          </a:xfrm>
-          <a:prstGeom prst="rect">
-            <a:avLst/>
-          </a:prstGeom>
-        </p:spPr>
-        <p:txBody>
-          <a:bodyPr wrap="none">
-            <a:spAutoFit/>
-          </a:bodyPr>
-          <a:lstStyle/>
-          <a:p>
-            <a:r>
-              <a:rPr lang="es-MX" sz="8800" dirty="0">
-                <a:solidFill>
-                  <a:schemeClr val="bg2"/>
-                </a:solidFill>
-              </a:rPr>
-              <a:t>¿Qué es          ?</a:t>
-            </a:r>
-            <a:endParaRPr lang="es-ES" dirty="0">
-              <a:solidFill>
-                <a:schemeClr val="bg2"/>
-              </a:solidFill>
-            </a:endParaRPr>
-          </a:p>
-        </p:txBody>
-      </p:sp>
-      <p:pic>
-        <p:nvPicPr>
-          <p:cNvPr id="5" name="Picture 4">
-            <a:extLst>
-              <a:ext uri="{FF2B5EF4-FFF2-40B4-BE49-F238E27FC236}">
-                <a16:creationId xmlns:a16="http://schemas.microsoft.com/office/drawing/2014/main" id="{7C120C3B-586F-4908-8FE8-963AB2EFE3AF}"/>
-              </a:ext>
-            </a:extLst>
-          </p:cNvPr>
-          <p:cNvPicPr>
-            <a:picLocks noChangeAspect="1"/>
-          </p:cNvPicPr>
-          <p:nvPr/>
-        </p:nvPicPr>
-        <p:blipFill>
-          <a:blip r:embed="rId2">
-            <a:extLst>
-              <a:ext uri="{28A0092B-C50C-407E-A947-70E740481C1C}">
-                <a14:useLocalDpi xmlns:a14="http://schemas.microsoft.com/office/drawing/2010/main" val="0"/>
-              </a:ext>
-            </a:extLst>
-          </a:blip>
-          <a:stretch>
-            <a:fillRect/>
-          </a:stretch>
-        </p:blipFill>
-        <p:spPr>
-          <a:xfrm>
-            <a:off x="6745309" y="3015484"/>
-            <a:ext cx="1824446" cy="652874"/>
-          </a:xfrm>
-          <a:prstGeom prst="rect">
-            <a:avLst/>
-          </a:prstGeom>
-        </p:spPr>
-      </p:pic>
+          <p:cNvSpPr>
+            <a:spLocks noGrp="1"/>
+          </p:cNvSpPr>
+          <p:nvPr>
+            <p:ph idx="1"/>
+          </p:nvPr>
+        </p:nvSpPr>
+        <p:spPr/>
+        <p:txBody>
+          <a:bodyPr/>
+          <a:lstStyle/>
+          <a:p>
+            <a:r>
+              <a:rPr lang="es-MX" dirty="0"/>
+              <a:t>Que todos tengan Git instalado y corriendo</a:t>
+            </a:r>
+          </a:p>
+          <a:p>
+            <a:endParaRPr lang="es-MX" dirty="0"/>
+          </a:p>
+          <a:p>
+            <a:r>
+              <a:rPr lang="es-MX" dirty="0"/>
+              <a:t>Saber los aspectos más básicos de Git</a:t>
+            </a:r>
+          </a:p>
+          <a:p>
+            <a:endParaRPr lang="es-MX" dirty="0"/>
+          </a:p>
+          <a:p>
+            <a:r>
+              <a:rPr lang="es-MX" dirty="0"/>
+              <a:t>Saber crear un repositorio de Git</a:t>
+            </a:r>
+            <a:endParaRPr lang="es-ES" dirty="0"/>
+          </a:p>
+        </p:txBody>
+      </p:sp>
     </p:spTree>
     <p:extLst>
       <p:ext uri="{BB962C8B-B14F-4D97-AF65-F5344CB8AC3E}">
-        <p14:creationId xmlns:p14="http://schemas.microsoft.com/office/powerpoint/2010/main" val="3156419099"/>
+        <p14:creationId xmlns:p14="http://schemas.microsoft.com/office/powerpoint/2010/main" val="3665162392"/>
       </p:ext>
     </p:extLst>
   </p:cSld>

</xml_diff>